<commit_message>
Modification de la présentation GIT
</commit_message>
<xml_diff>
--- a/presentation/GIT.pptx
+++ b/presentation/GIT.pptx
@@ -25,6 +25,11 @@
     <p:sldId id="273" r:id="rId19"/>
     <p:sldId id="274" r:id="rId20"/>
     <p:sldId id="275" r:id="rId21"/>
+    <p:sldId id="276" r:id="rId22"/>
+    <p:sldId id="277" r:id="rId23"/>
+    <p:sldId id="278" r:id="rId24"/>
+    <p:sldId id="279" r:id="rId25"/>
+    <p:sldId id="280" r:id="rId26"/>
   </p:sldIdLst>
   <p:sldSz cx="12192000" cy="6858000"/>
   <p:notesSz cx="6858000" cy="9144000"/>
@@ -260,7 +265,7 @@
           <a:p>
             <a:fld id="{268EF740-DEC9-4164-9F12-A661BAE534D1}" type="datetimeFigureOut">
               <a:rPr lang="fr-FR" smtClean="0"/>
-              <a:t>18/09/2016</a:t>
+              <a:t>27/09/2016</a:t>
             </a:fld>
             <a:endParaRPr lang="fr-FR"/>
           </a:p>
@@ -428,7 +433,7 @@
           <a:p>
             <a:fld id="{268EF740-DEC9-4164-9F12-A661BAE534D1}" type="datetimeFigureOut">
               <a:rPr lang="fr-FR" smtClean="0"/>
-              <a:t>18/09/2016</a:t>
+              <a:t>27/09/2016</a:t>
             </a:fld>
             <a:endParaRPr lang="fr-FR"/>
           </a:p>
@@ -606,7 +611,7 @@
           <a:p>
             <a:fld id="{268EF740-DEC9-4164-9F12-A661BAE534D1}" type="datetimeFigureOut">
               <a:rPr lang="fr-FR" smtClean="0"/>
-              <a:t>18/09/2016</a:t>
+              <a:t>27/09/2016</a:t>
             </a:fld>
             <a:endParaRPr lang="fr-FR"/>
           </a:p>
@@ -774,7 +779,7 @@
           <a:p>
             <a:fld id="{268EF740-DEC9-4164-9F12-A661BAE534D1}" type="datetimeFigureOut">
               <a:rPr lang="fr-FR" smtClean="0"/>
-              <a:t>18/09/2016</a:t>
+              <a:t>27/09/2016</a:t>
             </a:fld>
             <a:endParaRPr lang="fr-FR"/>
           </a:p>
@@ -1019,7 +1024,7 @@
           <a:p>
             <a:fld id="{268EF740-DEC9-4164-9F12-A661BAE534D1}" type="datetimeFigureOut">
               <a:rPr lang="fr-FR" smtClean="0"/>
-              <a:t>18/09/2016</a:t>
+              <a:t>27/09/2016</a:t>
             </a:fld>
             <a:endParaRPr lang="fr-FR"/>
           </a:p>
@@ -1248,7 +1253,7 @@
           <a:p>
             <a:fld id="{268EF740-DEC9-4164-9F12-A661BAE534D1}" type="datetimeFigureOut">
               <a:rPr lang="fr-FR" smtClean="0"/>
-              <a:t>18/09/2016</a:t>
+              <a:t>27/09/2016</a:t>
             </a:fld>
             <a:endParaRPr lang="fr-FR"/>
           </a:p>
@@ -1612,7 +1617,7 @@
           <a:p>
             <a:fld id="{268EF740-DEC9-4164-9F12-A661BAE534D1}" type="datetimeFigureOut">
               <a:rPr lang="fr-FR" smtClean="0"/>
-              <a:t>18/09/2016</a:t>
+              <a:t>27/09/2016</a:t>
             </a:fld>
             <a:endParaRPr lang="fr-FR"/>
           </a:p>
@@ -1729,7 +1734,7 @@
           <a:p>
             <a:fld id="{268EF740-DEC9-4164-9F12-A661BAE534D1}" type="datetimeFigureOut">
               <a:rPr lang="fr-FR" smtClean="0"/>
-              <a:t>18/09/2016</a:t>
+              <a:t>27/09/2016</a:t>
             </a:fld>
             <a:endParaRPr lang="fr-FR"/>
           </a:p>
@@ -1824,7 +1829,7 @@
           <a:p>
             <a:fld id="{268EF740-DEC9-4164-9F12-A661BAE534D1}" type="datetimeFigureOut">
               <a:rPr lang="fr-FR" smtClean="0"/>
-              <a:t>18/09/2016</a:t>
+              <a:t>27/09/2016</a:t>
             </a:fld>
             <a:endParaRPr lang="fr-FR"/>
           </a:p>
@@ -2099,7 +2104,7 @@
           <a:p>
             <a:fld id="{268EF740-DEC9-4164-9F12-A661BAE534D1}" type="datetimeFigureOut">
               <a:rPr lang="fr-FR" smtClean="0"/>
-              <a:t>18/09/2016</a:t>
+              <a:t>27/09/2016</a:t>
             </a:fld>
             <a:endParaRPr lang="fr-FR"/>
           </a:p>
@@ -2351,7 +2356,7 @@
           <a:p>
             <a:fld id="{268EF740-DEC9-4164-9F12-A661BAE534D1}" type="datetimeFigureOut">
               <a:rPr lang="fr-FR" smtClean="0"/>
-              <a:t>18/09/2016</a:t>
+              <a:t>27/09/2016</a:t>
             </a:fld>
             <a:endParaRPr lang="fr-FR"/>
           </a:p>
@@ -2562,7 +2567,7 @@
           <a:p>
             <a:fld id="{268EF740-DEC9-4164-9F12-A661BAE534D1}" type="datetimeFigureOut">
               <a:rPr lang="fr-FR" smtClean="0"/>
-              <a:t>18/09/2016</a:t>
+              <a:t>27/09/2016</a:t>
             </a:fld>
             <a:endParaRPr lang="fr-FR"/>
           </a:p>
@@ -15551,6 +15556,3144 @@
 </p:sld>
 </file>
 
+<file path=ppt/slides/slide21.xml><?xml version="1.0" encoding="utf-8"?>
+<p:sld xmlns:a="http://schemas.openxmlformats.org/drawingml/2006/main" xmlns:r="http://schemas.openxmlformats.org/officeDocument/2006/relationships" xmlns:p="http://schemas.openxmlformats.org/presentationml/2006/main">
+  <p:cSld>
+    <p:spTree>
+      <p:nvGrpSpPr>
+        <p:cNvPr id="1" name=""/>
+        <p:cNvGrpSpPr/>
+        <p:nvPr/>
+      </p:nvGrpSpPr>
+      <p:grpSpPr>
+        <a:xfrm>
+          <a:off x="0" y="0"/>
+          <a:ext cx="0" cy="0"/>
+          <a:chOff x="0" y="0"/>
+          <a:chExt cx="0" cy="0"/>
+        </a:xfrm>
+      </p:grpSpPr>
+      <p:sp>
+        <p:nvSpPr>
+          <p:cNvPr id="5" name="Subtitle 2"/>
+          <p:cNvSpPr txBox="1">
+            <a:spLocks/>
+          </p:cNvSpPr>
+          <p:nvPr/>
+        </p:nvSpPr>
+        <p:spPr>
+          <a:xfrm>
+            <a:off x="145774" y="665312"/>
+            <a:ext cx="11886701" cy="603448"/>
+          </a:xfrm>
+          <a:prstGeom prst="rect">
+            <a:avLst/>
+          </a:prstGeom>
+        </p:spPr>
+        <p:txBody>
+          <a:bodyPr vert="horz" lIns="91440" tIns="45720" rIns="91440" bIns="45720" rtlCol="0">
+            <a:noAutofit/>
+          </a:bodyPr>
+          <a:lstStyle>
+            <a:lvl1pPr marL="342900" indent="-342900" algn="l" defTabSz="914400" rtl="0" eaLnBrk="1" latinLnBrk="0" hangingPunct="1">
+              <a:spcBef>
+                <a:spcPct val="20000"/>
+              </a:spcBef>
+              <a:buFont typeface="Arial" pitchFamily="34" charset="0"/>
+              <a:buChar char="•"/>
+              <a:defRPr sz="3200" kern="1200">
+                <a:solidFill>
+                  <a:schemeClr val="tx1"/>
+                </a:solidFill>
+                <a:latin typeface="+mn-lt"/>
+                <a:ea typeface="+mn-ea"/>
+                <a:cs typeface="+mn-cs"/>
+              </a:defRPr>
+            </a:lvl1pPr>
+            <a:lvl2pPr marL="742950" indent="-285750" algn="l" defTabSz="914400" rtl="0" eaLnBrk="1" latinLnBrk="0" hangingPunct="1">
+              <a:spcBef>
+                <a:spcPct val="20000"/>
+              </a:spcBef>
+              <a:buFont typeface="Arial" pitchFamily="34" charset="0"/>
+              <a:buChar char="–"/>
+              <a:defRPr sz="2800" kern="1200">
+                <a:solidFill>
+                  <a:schemeClr val="tx1"/>
+                </a:solidFill>
+                <a:latin typeface="+mn-lt"/>
+                <a:ea typeface="+mn-ea"/>
+                <a:cs typeface="+mn-cs"/>
+              </a:defRPr>
+            </a:lvl2pPr>
+            <a:lvl3pPr marL="1143000" indent="-228600" algn="l" defTabSz="914400" rtl="0" eaLnBrk="1" latinLnBrk="0" hangingPunct="1">
+              <a:spcBef>
+                <a:spcPct val="20000"/>
+              </a:spcBef>
+              <a:buFont typeface="Arial" pitchFamily="34" charset="0"/>
+              <a:buChar char="•"/>
+              <a:defRPr sz="2400" kern="1200">
+                <a:solidFill>
+                  <a:schemeClr val="tx1"/>
+                </a:solidFill>
+                <a:latin typeface="+mn-lt"/>
+                <a:ea typeface="+mn-ea"/>
+                <a:cs typeface="+mn-cs"/>
+              </a:defRPr>
+            </a:lvl3pPr>
+            <a:lvl4pPr marL="1600200" indent="-228600" algn="l" defTabSz="914400" rtl="0" eaLnBrk="1" latinLnBrk="0" hangingPunct="1">
+              <a:spcBef>
+                <a:spcPct val="20000"/>
+              </a:spcBef>
+              <a:buFont typeface="Arial" pitchFamily="34" charset="0"/>
+              <a:buChar char="–"/>
+              <a:defRPr sz="2000" kern="1200">
+                <a:solidFill>
+                  <a:schemeClr val="tx1"/>
+                </a:solidFill>
+                <a:latin typeface="+mn-lt"/>
+                <a:ea typeface="+mn-ea"/>
+                <a:cs typeface="+mn-cs"/>
+              </a:defRPr>
+            </a:lvl4pPr>
+            <a:lvl5pPr marL="2057400" indent="-228600" algn="l" defTabSz="914400" rtl="0" eaLnBrk="1" latinLnBrk="0" hangingPunct="1">
+              <a:spcBef>
+                <a:spcPct val="20000"/>
+              </a:spcBef>
+              <a:buFont typeface="Arial" pitchFamily="34" charset="0"/>
+              <a:buChar char="»"/>
+              <a:defRPr sz="2000" kern="1200">
+                <a:solidFill>
+                  <a:schemeClr val="tx1"/>
+                </a:solidFill>
+                <a:latin typeface="+mn-lt"/>
+                <a:ea typeface="+mn-ea"/>
+                <a:cs typeface="+mn-cs"/>
+              </a:defRPr>
+            </a:lvl5pPr>
+            <a:lvl6pPr marL="2514600" indent="-228600" algn="l" defTabSz="914400" rtl="0" eaLnBrk="1" latinLnBrk="0" hangingPunct="1">
+              <a:spcBef>
+                <a:spcPct val="20000"/>
+              </a:spcBef>
+              <a:buFont typeface="Arial" pitchFamily="34" charset="0"/>
+              <a:buChar char="•"/>
+              <a:defRPr sz="2000" kern="1200">
+                <a:solidFill>
+                  <a:schemeClr val="tx1"/>
+                </a:solidFill>
+                <a:latin typeface="+mn-lt"/>
+                <a:ea typeface="+mn-ea"/>
+                <a:cs typeface="+mn-cs"/>
+              </a:defRPr>
+            </a:lvl6pPr>
+            <a:lvl7pPr marL="2971800" indent="-228600" algn="l" defTabSz="914400" rtl="0" eaLnBrk="1" latinLnBrk="0" hangingPunct="1">
+              <a:spcBef>
+                <a:spcPct val="20000"/>
+              </a:spcBef>
+              <a:buFont typeface="Arial" pitchFamily="34" charset="0"/>
+              <a:buChar char="•"/>
+              <a:defRPr sz="2000" kern="1200">
+                <a:solidFill>
+                  <a:schemeClr val="tx1"/>
+                </a:solidFill>
+                <a:latin typeface="+mn-lt"/>
+                <a:ea typeface="+mn-ea"/>
+                <a:cs typeface="+mn-cs"/>
+              </a:defRPr>
+            </a:lvl7pPr>
+            <a:lvl8pPr marL="3429000" indent="-228600" algn="l" defTabSz="914400" rtl="0" eaLnBrk="1" latinLnBrk="0" hangingPunct="1">
+              <a:spcBef>
+                <a:spcPct val="20000"/>
+              </a:spcBef>
+              <a:buFont typeface="Arial" pitchFamily="34" charset="0"/>
+              <a:buChar char="•"/>
+              <a:defRPr sz="2000" kern="1200">
+                <a:solidFill>
+                  <a:schemeClr val="tx1"/>
+                </a:solidFill>
+                <a:latin typeface="+mn-lt"/>
+                <a:ea typeface="+mn-ea"/>
+                <a:cs typeface="+mn-cs"/>
+              </a:defRPr>
+            </a:lvl8pPr>
+            <a:lvl9pPr marL="3886200" indent="-228600" algn="l" defTabSz="914400" rtl="0" eaLnBrk="1" latinLnBrk="0" hangingPunct="1">
+              <a:spcBef>
+                <a:spcPct val="20000"/>
+              </a:spcBef>
+              <a:buFont typeface="Arial" pitchFamily="34" charset="0"/>
+              <a:buChar char="•"/>
+              <a:defRPr sz="2000" kern="1200">
+                <a:solidFill>
+                  <a:schemeClr val="tx1"/>
+                </a:solidFill>
+                <a:latin typeface="+mn-lt"/>
+                <a:ea typeface="+mn-ea"/>
+                <a:cs typeface="+mn-cs"/>
+              </a:defRPr>
+            </a:lvl9pPr>
+          </a:lstStyle>
+          <a:p>
+            <a:pPr marL="0" indent="0">
+              <a:buNone/>
+            </a:pPr>
+            <a:r>
+              <a:rPr lang="en-US" sz="4000" b="1" spc="-150" dirty="0">
+                <a:solidFill>
+                  <a:srgbClr val="F5C24C"/>
+                </a:solidFill>
+                <a:latin typeface="Signika Negative" pitchFamily="2" charset="0"/>
+                <a:ea typeface="Franchise" pitchFamily="49" charset="0"/>
+              </a:rPr>
+              <a:t>*</a:t>
+            </a:r>
+            <a:r>
+              <a:rPr lang="en-US" sz="4000" b="1" spc="-150" dirty="0">
+                <a:solidFill>
+                  <a:schemeClr val="tx1">
+                    <a:lumMod val="65000"/>
+                    <a:lumOff val="35000"/>
+                  </a:schemeClr>
+                </a:solidFill>
+                <a:latin typeface="Signika Negative" pitchFamily="2" charset="0"/>
+                <a:ea typeface="Franchise" pitchFamily="49" charset="0"/>
+              </a:rPr>
+              <a:t> </a:t>
+            </a:r>
+            <a:r>
+              <a:rPr lang="en-US" sz="4000" b="1" spc="-150" dirty="0" err="1">
+                <a:solidFill>
+                  <a:schemeClr val="tx1">
+                    <a:lumMod val="65000"/>
+                    <a:lumOff val="35000"/>
+                  </a:schemeClr>
+                </a:solidFill>
+                <a:latin typeface="Signika Negative" pitchFamily="2" charset="0"/>
+                <a:ea typeface="Franchise" pitchFamily="49" charset="0"/>
+              </a:rPr>
+              <a:t>Exemple</a:t>
+            </a:r>
+            <a:r>
+              <a:rPr lang="en-US" sz="4000" b="1" spc="-150" dirty="0">
+                <a:solidFill>
+                  <a:schemeClr val="tx1">
+                    <a:lumMod val="65000"/>
+                    <a:lumOff val="35000"/>
+                  </a:schemeClr>
+                </a:solidFill>
+                <a:latin typeface="Signika Negative" pitchFamily="2" charset="0"/>
+                <a:ea typeface="Franchise" pitchFamily="49" charset="0"/>
+              </a:rPr>
+              <a:t> de </a:t>
+            </a:r>
+            <a:r>
+              <a:rPr lang="en-US" sz="4000" b="1" spc="-150" dirty="0" err="1">
+                <a:solidFill>
+                  <a:schemeClr val="tx1">
+                    <a:lumMod val="65000"/>
+                    <a:lumOff val="35000"/>
+                  </a:schemeClr>
+                </a:solidFill>
+                <a:latin typeface="Signika Negative" pitchFamily="2" charset="0"/>
+                <a:ea typeface="Franchise" pitchFamily="49" charset="0"/>
+              </a:rPr>
+              <a:t>commande</a:t>
+            </a:r>
+            <a:r>
+              <a:rPr lang="en-US" sz="4000" b="1" spc="-150" dirty="0">
+                <a:solidFill>
+                  <a:schemeClr val="tx1">
+                    <a:lumMod val="65000"/>
+                    <a:lumOff val="35000"/>
+                  </a:schemeClr>
+                </a:solidFill>
+                <a:latin typeface="Signika Negative" pitchFamily="2" charset="0"/>
+                <a:ea typeface="Franchise" pitchFamily="49" charset="0"/>
+              </a:rPr>
+              <a:t> pour tout faire</a:t>
+            </a:r>
+          </a:p>
+        </p:txBody>
+      </p:sp>
+      <p:sp>
+        <p:nvSpPr>
+          <p:cNvPr id="6" name="Flowchart: Off-page Connector 29"/>
+          <p:cNvSpPr/>
+          <p:nvPr/>
+        </p:nvSpPr>
+        <p:spPr>
+          <a:xfrm>
+            <a:off x="11526790" y="123637"/>
+            <a:ext cx="505685" cy="313685"/>
+          </a:xfrm>
+          <a:prstGeom prst="flowChartOffpageConnector">
+            <a:avLst/>
+          </a:prstGeom>
+          <a:solidFill>
+            <a:srgbClr val="F5C24C"/>
+          </a:solidFill>
+          <a:ln w="6350">
+            <a:noFill/>
+          </a:ln>
+        </p:spPr>
+        <p:style>
+          <a:lnRef idx="2">
+            <a:schemeClr val="accent1">
+              <a:shade val="50000"/>
+            </a:schemeClr>
+          </a:lnRef>
+          <a:fillRef idx="1">
+            <a:schemeClr val="accent1"/>
+          </a:fillRef>
+          <a:effectRef idx="0">
+            <a:schemeClr val="accent1"/>
+          </a:effectRef>
+          <a:fontRef idx="minor">
+            <a:schemeClr val="lt1"/>
+          </a:fontRef>
+        </p:style>
+        <p:txBody>
+          <a:bodyPr rtlCol="0" anchor="ctr"/>
+          <a:lstStyle/>
+          <a:p>
+            <a:pPr algn="ctr"/>
+            <a:r>
+              <a:rPr lang="en-US" sz="1200" b="1" dirty="0"/>
+              <a:t>20</a:t>
+            </a:r>
+          </a:p>
+        </p:txBody>
+      </p:sp>
+      <p:cxnSp>
+        <p:nvCxnSpPr>
+          <p:cNvPr id="4" name="Connecteur droit 3"/>
+          <p:cNvCxnSpPr/>
+          <p:nvPr/>
+        </p:nvCxnSpPr>
+        <p:spPr>
+          <a:xfrm>
+            <a:off x="4108174" y="1881809"/>
+            <a:ext cx="0" cy="3869634"/>
+          </a:xfrm>
+          <a:prstGeom prst="line">
+            <a:avLst/>
+          </a:prstGeom>
+          <a:ln w="22225"/>
+        </p:spPr>
+        <p:style>
+          <a:lnRef idx="1">
+            <a:schemeClr val="dk1"/>
+          </a:lnRef>
+          <a:fillRef idx="0">
+            <a:schemeClr val="dk1"/>
+          </a:fillRef>
+          <a:effectRef idx="0">
+            <a:schemeClr val="dk1"/>
+          </a:effectRef>
+          <a:fontRef idx="minor">
+            <a:schemeClr val="tx1"/>
+          </a:fontRef>
+        </p:style>
+      </p:cxnSp>
+      <p:cxnSp>
+        <p:nvCxnSpPr>
+          <p:cNvPr id="22" name="Connecteur droit 21"/>
+          <p:cNvCxnSpPr/>
+          <p:nvPr/>
+        </p:nvCxnSpPr>
+        <p:spPr>
+          <a:xfrm>
+            <a:off x="7494104" y="1881809"/>
+            <a:ext cx="0" cy="4532243"/>
+          </a:xfrm>
+          <a:prstGeom prst="line">
+            <a:avLst/>
+          </a:prstGeom>
+          <a:ln w="22225"/>
+        </p:spPr>
+        <p:style>
+          <a:lnRef idx="1">
+            <a:schemeClr val="dk1"/>
+          </a:lnRef>
+          <a:fillRef idx="0">
+            <a:schemeClr val="dk1"/>
+          </a:fillRef>
+          <a:effectRef idx="0">
+            <a:schemeClr val="dk1"/>
+          </a:effectRef>
+          <a:fontRef idx="minor">
+            <a:schemeClr val="tx1"/>
+          </a:fontRef>
+        </p:style>
+      </p:cxnSp>
+      <p:sp>
+        <p:nvSpPr>
+          <p:cNvPr id="7" name="Ellipse 6"/>
+          <p:cNvSpPr/>
+          <p:nvPr/>
+        </p:nvSpPr>
+        <p:spPr>
+          <a:xfrm>
+            <a:off x="7368209" y="6294783"/>
+            <a:ext cx="238539" cy="238539"/>
+          </a:xfrm>
+          <a:prstGeom prst="ellipse">
+            <a:avLst/>
+          </a:prstGeom>
+          <a:solidFill>
+            <a:schemeClr val="bg1"/>
+          </a:solidFill>
+          <a:ln>
+            <a:solidFill>
+              <a:schemeClr val="tx1"/>
+            </a:solidFill>
+          </a:ln>
+        </p:spPr>
+        <p:style>
+          <a:lnRef idx="2">
+            <a:schemeClr val="accent1">
+              <a:shade val="50000"/>
+            </a:schemeClr>
+          </a:lnRef>
+          <a:fillRef idx="1">
+            <a:schemeClr val="accent1"/>
+          </a:fillRef>
+          <a:effectRef idx="0">
+            <a:schemeClr val="accent1"/>
+          </a:effectRef>
+          <a:fontRef idx="minor">
+            <a:schemeClr val="lt1"/>
+          </a:fontRef>
+        </p:style>
+        <p:txBody>
+          <a:bodyPr rtlCol="0" anchor="ctr"/>
+          <a:lstStyle/>
+          <a:p>
+            <a:pPr algn="ctr"/>
+            <a:endParaRPr lang="fr-FR"/>
+          </a:p>
+        </p:txBody>
+      </p:sp>
+      <p:sp>
+        <p:nvSpPr>
+          <p:cNvPr id="9" name="Ellipse 8"/>
+          <p:cNvSpPr/>
+          <p:nvPr/>
+        </p:nvSpPr>
+        <p:spPr>
+          <a:xfrm>
+            <a:off x="4015409" y="5565913"/>
+            <a:ext cx="185530" cy="185530"/>
+          </a:xfrm>
+          <a:prstGeom prst="ellipse">
+            <a:avLst/>
+          </a:prstGeom>
+          <a:solidFill>
+            <a:schemeClr val="tx1"/>
+          </a:solidFill>
+          <a:ln>
+            <a:solidFill>
+              <a:schemeClr val="tx1"/>
+            </a:solidFill>
+          </a:ln>
+        </p:spPr>
+        <p:style>
+          <a:lnRef idx="2">
+            <a:schemeClr val="accent1">
+              <a:shade val="50000"/>
+            </a:schemeClr>
+          </a:lnRef>
+          <a:fillRef idx="1">
+            <a:schemeClr val="accent1"/>
+          </a:fillRef>
+          <a:effectRef idx="0">
+            <a:schemeClr val="accent1"/>
+          </a:effectRef>
+          <a:fontRef idx="minor">
+            <a:schemeClr val="lt1"/>
+          </a:fontRef>
+        </p:style>
+        <p:txBody>
+          <a:bodyPr rtlCol="0" anchor="ctr"/>
+          <a:lstStyle/>
+          <a:p>
+            <a:pPr algn="ctr"/>
+            <a:endParaRPr lang="fr-FR"/>
+          </a:p>
+        </p:txBody>
+      </p:sp>
+      <p:cxnSp>
+        <p:nvCxnSpPr>
+          <p:cNvPr id="11" name="Connecteur droit 10"/>
+          <p:cNvCxnSpPr>
+            <a:endCxn id="9" idx="6"/>
+          </p:cNvCxnSpPr>
+          <p:nvPr/>
+        </p:nvCxnSpPr>
+        <p:spPr>
+          <a:xfrm flipH="1" flipV="1">
+            <a:off x="4200939" y="5658678"/>
+            <a:ext cx="3293165" cy="397565"/>
+          </a:xfrm>
+          <a:prstGeom prst="line">
+            <a:avLst/>
+          </a:prstGeom>
+          <a:ln>
+            <a:solidFill>
+              <a:schemeClr val="tx1"/>
+            </a:solidFill>
+          </a:ln>
+        </p:spPr>
+        <p:style>
+          <a:lnRef idx="1">
+            <a:schemeClr val="accent1"/>
+          </a:lnRef>
+          <a:fillRef idx="0">
+            <a:schemeClr val="accent1"/>
+          </a:fillRef>
+          <a:effectRef idx="0">
+            <a:schemeClr val="accent1"/>
+          </a:effectRef>
+          <a:fontRef idx="minor">
+            <a:schemeClr val="tx1"/>
+          </a:fontRef>
+        </p:style>
+      </p:cxnSp>
+      <p:cxnSp>
+        <p:nvCxnSpPr>
+          <p:cNvPr id="24" name="Connecteur droit avec flèche 23"/>
+          <p:cNvCxnSpPr/>
+          <p:nvPr/>
+        </p:nvCxnSpPr>
+        <p:spPr>
+          <a:xfrm flipH="1" flipV="1">
+            <a:off x="4108174" y="3564834"/>
+            <a:ext cx="3385930" cy="755374"/>
+          </a:xfrm>
+          <a:prstGeom prst="straightConnector1">
+            <a:avLst/>
+          </a:prstGeom>
+          <a:ln>
+            <a:solidFill>
+              <a:schemeClr val="tx1"/>
+            </a:solidFill>
+            <a:tailEnd type="triangle"/>
+          </a:ln>
+        </p:spPr>
+        <p:style>
+          <a:lnRef idx="1">
+            <a:schemeClr val="accent1"/>
+          </a:lnRef>
+          <a:fillRef idx="0">
+            <a:schemeClr val="accent1"/>
+          </a:fillRef>
+          <a:effectRef idx="0">
+            <a:schemeClr val="accent1"/>
+          </a:effectRef>
+          <a:fontRef idx="minor">
+            <a:schemeClr val="tx1"/>
+          </a:fontRef>
+        </p:style>
+      </p:cxnSp>
+      <p:cxnSp>
+        <p:nvCxnSpPr>
+          <p:cNvPr id="26" name="Connecteur droit avec flèche 25"/>
+          <p:cNvCxnSpPr/>
+          <p:nvPr/>
+        </p:nvCxnSpPr>
+        <p:spPr>
+          <a:xfrm flipV="1">
+            <a:off x="4108174" y="2504661"/>
+            <a:ext cx="3385930" cy="1020417"/>
+          </a:xfrm>
+          <a:prstGeom prst="straightConnector1">
+            <a:avLst/>
+          </a:prstGeom>
+          <a:ln>
+            <a:solidFill>
+              <a:schemeClr val="tx1"/>
+            </a:solidFill>
+            <a:tailEnd type="triangle"/>
+          </a:ln>
+        </p:spPr>
+        <p:style>
+          <a:lnRef idx="1">
+            <a:schemeClr val="accent1"/>
+          </a:lnRef>
+          <a:fillRef idx="0">
+            <a:schemeClr val="accent1"/>
+          </a:fillRef>
+          <a:effectRef idx="0">
+            <a:schemeClr val="accent1"/>
+          </a:effectRef>
+          <a:fontRef idx="minor">
+            <a:schemeClr val="tx1"/>
+          </a:fontRef>
+        </p:style>
+      </p:cxnSp>
+      <p:sp>
+        <p:nvSpPr>
+          <p:cNvPr id="27" name="Ellipse 26"/>
+          <p:cNvSpPr/>
+          <p:nvPr/>
+        </p:nvSpPr>
+        <p:spPr>
+          <a:xfrm>
+            <a:off x="4066263" y="4328906"/>
+            <a:ext cx="77111" cy="82930"/>
+          </a:xfrm>
+          <a:prstGeom prst="ellipse">
+            <a:avLst/>
+          </a:prstGeom>
+          <a:solidFill>
+            <a:schemeClr val="tx1"/>
+          </a:solidFill>
+          <a:ln>
+            <a:solidFill>
+              <a:schemeClr val="tx1"/>
+            </a:solidFill>
+          </a:ln>
+        </p:spPr>
+        <p:style>
+          <a:lnRef idx="2">
+            <a:schemeClr val="accent1">
+              <a:shade val="50000"/>
+            </a:schemeClr>
+          </a:lnRef>
+          <a:fillRef idx="1">
+            <a:schemeClr val="accent1"/>
+          </a:fillRef>
+          <a:effectRef idx="0">
+            <a:schemeClr val="accent1"/>
+          </a:effectRef>
+          <a:fontRef idx="minor">
+            <a:schemeClr val="lt1"/>
+          </a:fontRef>
+        </p:style>
+        <p:txBody>
+          <a:bodyPr rtlCol="0" anchor="ctr"/>
+          <a:lstStyle/>
+          <a:p>
+            <a:pPr algn="ctr"/>
+            <a:endParaRPr lang="fr-FR"/>
+          </a:p>
+        </p:txBody>
+      </p:sp>
+      <p:sp>
+        <p:nvSpPr>
+          <p:cNvPr id="28" name="Ellipse 27"/>
+          <p:cNvSpPr/>
+          <p:nvPr/>
+        </p:nvSpPr>
+        <p:spPr>
+          <a:xfrm>
+            <a:off x="4066263" y="4700381"/>
+            <a:ext cx="77111" cy="82930"/>
+          </a:xfrm>
+          <a:prstGeom prst="ellipse">
+            <a:avLst/>
+          </a:prstGeom>
+          <a:solidFill>
+            <a:schemeClr val="tx1"/>
+          </a:solidFill>
+          <a:ln>
+            <a:solidFill>
+              <a:schemeClr val="tx1"/>
+            </a:solidFill>
+          </a:ln>
+        </p:spPr>
+        <p:style>
+          <a:lnRef idx="2">
+            <a:schemeClr val="accent1">
+              <a:shade val="50000"/>
+            </a:schemeClr>
+          </a:lnRef>
+          <a:fillRef idx="1">
+            <a:schemeClr val="accent1"/>
+          </a:fillRef>
+          <a:effectRef idx="0">
+            <a:schemeClr val="accent1"/>
+          </a:effectRef>
+          <a:fontRef idx="minor">
+            <a:schemeClr val="lt1"/>
+          </a:fontRef>
+        </p:style>
+        <p:txBody>
+          <a:bodyPr rtlCol="0" anchor="ctr"/>
+          <a:lstStyle/>
+          <a:p>
+            <a:pPr algn="ctr"/>
+            <a:endParaRPr lang="fr-FR"/>
+          </a:p>
+        </p:txBody>
+      </p:sp>
+      <p:sp>
+        <p:nvSpPr>
+          <p:cNvPr id="29" name="Ellipse 28"/>
+          <p:cNvSpPr/>
+          <p:nvPr/>
+        </p:nvSpPr>
+        <p:spPr>
+          <a:xfrm>
+            <a:off x="4066263" y="5109956"/>
+            <a:ext cx="77111" cy="82930"/>
+          </a:xfrm>
+          <a:prstGeom prst="ellipse">
+            <a:avLst/>
+          </a:prstGeom>
+          <a:solidFill>
+            <a:schemeClr val="tx1"/>
+          </a:solidFill>
+          <a:ln>
+            <a:solidFill>
+              <a:schemeClr val="tx1"/>
+            </a:solidFill>
+          </a:ln>
+        </p:spPr>
+        <p:style>
+          <a:lnRef idx="2">
+            <a:schemeClr val="accent1">
+              <a:shade val="50000"/>
+            </a:schemeClr>
+          </a:lnRef>
+          <a:fillRef idx="1">
+            <a:schemeClr val="accent1"/>
+          </a:fillRef>
+          <a:effectRef idx="0">
+            <a:schemeClr val="accent1"/>
+          </a:effectRef>
+          <a:fontRef idx="minor">
+            <a:schemeClr val="lt1"/>
+          </a:fontRef>
+        </p:style>
+        <p:txBody>
+          <a:bodyPr rtlCol="0" anchor="ctr"/>
+          <a:lstStyle/>
+          <a:p>
+            <a:pPr algn="ctr"/>
+            <a:endParaRPr lang="fr-FR"/>
+          </a:p>
+        </p:txBody>
+      </p:sp>
+      <p:sp>
+        <p:nvSpPr>
+          <p:cNvPr id="30" name="Ellipse 29"/>
+          <p:cNvSpPr/>
+          <p:nvPr/>
+        </p:nvSpPr>
+        <p:spPr>
+          <a:xfrm>
+            <a:off x="5406887" y="5923722"/>
+            <a:ext cx="516835" cy="490330"/>
+          </a:xfrm>
+          <a:prstGeom prst="ellipse">
+            <a:avLst/>
+          </a:prstGeom>
+          <a:solidFill>
+            <a:schemeClr val="bg1"/>
+          </a:solidFill>
+          <a:ln>
+            <a:solidFill>
+              <a:schemeClr val="tx1"/>
+            </a:solidFill>
+          </a:ln>
+        </p:spPr>
+        <p:style>
+          <a:lnRef idx="2">
+            <a:schemeClr val="accent1">
+              <a:shade val="50000"/>
+            </a:schemeClr>
+          </a:lnRef>
+          <a:fillRef idx="1">
+            <a:schemeClr val="accent1"/>
+          </a:fillRef>
+          <a:effectRef idx="0">
+            <a:schemeClr val="accent1"/>
+          </a:effectRef>
+          <a:fontRef idx="minor">
+            <a:schemeClr val="lt1"/>
+          </a:fontRef>
+        </p:style>
+        <p:txBody>
+          <a:bodyPr rtlCol="0" anchor="ctr"/>
+          <a:lstStyle/>
+          <a:p>
+            <a:pPr algn="ctr"/>
+            <a:r>
+              <a:rPr lang="fr-FR" dirty="0">
+                <a:solidFill>
+                  <a:schemeClr val="tx1"/>
+                </a:solidFill>
+              </a:rPr>
+              <a:t>1</a:t>
+            </a:r>
+          </a:p>
+        </p:txBody>
+      </p:sp>
+      <p:sp>
+        <p:nvSpPr>
+          <p:cNvPr id="35" name="Ellipse 34"/>
+          <p:cNvSpPr/>
+          <p:nvPr/>
+        </p:nvSpPr>
+        <p:spPr>
+          <a:xfrm>
+            <a:off x="3286539" y="4538146"/>
+            <a:ext cx="516835" cy="490330"/>
+          </a:xfrm>
+          <a:prstGeom prst="ellipse">
+            <a:avLst/>
+          </a:prstGeom>
+          <a:solidFill>
+            <a:schemeClr val="bg1"/>
+          </a:solidFill>
+          <a:ln>
+            <a:solidFill>
+              <a:schemeClr val="tx1"/>
+            </a:solidFill>
+          </a:ln>
+        </p:spPr>
+        <p:style>
+          <a:lnRef idx="2">
+            <a:schemeClr val="accent1">
+              <a:shade val="50000"/>
+            </a:schemeClr>
+          </a:lnRef>
+          <a:fillRef idx="1">
+            <a:schemeClr val="accent1"/>
+          </a:fillRef>
+          <a:effectRef idx="0">
+            <a:schemeClr val="accent1"/>
+          </a:effectRef>
+          <a:fontRef idx="minor">
+            <a:schemeClr val="lt1"/>
+          </a:fontRef>
+        </p:style>
+        <p:txBody>
+          <a:bodyPr rtlCol="0" anchor="ctr"/>
+          <a:lstStyle/>
+          <a:p>
+            <a:pPr algn="ctr"/>
+            <a:r>
+              <a:rPr lang="fr-FR" dirty="0">
+                <a:solidFill>
+                  <a:schemeClr val="tx1"/>
+                </a:solidFill>
+              </a:rPr>
+              <a:t>2</a:t>
+            </a:r>
+          </a:p>
+        </p:txBody>
+      </p:sp>
+      <p:sp>
+        <p:nvSpPr>
+          <p:cNvPr id="36" name="Ellipse 35"/>
+          <p:cNvSpPr/>
+          <p:nvPr/>
+        </p:nvSpPr>
+        <p:spPr>
+          <a:xfrm>
+            <a:off x="5455338" y="4055165"/>
+            <a:ext cx="516835" cy="490330"/>
+          </a:xfrm>
+          <a:prstGeom prst="ellipse">
+            <a:avLst/>
+          </a:prstGeom>
+          <a:solidFill>
+            <a:schemeClr val="bg1"/>
+          </a:solidFill>
+          <a:ln>
+            <a:solidFill>
+              <a:schemeClr val="tx1"/>
+            </a:solidFill>
+          </a:ln>
+        </p:spPr>
+        <p:style>
+          <a:lnRef idx="2">
+            <a:schemeClr val="accent1">
+              <a:shade val="50000"/>
+            </a:schemeClr>
+          </a:lnRef>
+          <a:fillRef idx="1">
+            <a:schemeClr val="accent1"/>
+          </a:fillRef>
+          <a:effectRef idx="0">
+            <a:schemeClr val="accent1"/>
+          </a:effectRef>
+          <a:fontRef idx="minor">
+            <a:schemeClr val="lt1"/>
+          </a:fontRef>
+        </p:style>
+        <p:txBody>
+          <a:bodyPr rtlCol="0" anchor="ctr"/>
+          <a:lstStyle/>
+          <a:p>
+            <a:pPr algn="ctr"/>
+            <a:r>
+              <a:rPr lang="fr-FR" dirty="0">
+                <a:solidFill>
+                  <a:schemeClr val="tx1"/>
+                </a:solidFill>
+              </a:rPr>
+              <a:t>3</a:t>
+            </a:r>
+          </a:p>
+        </p:txBody>
+      </p:sp>
+      <p:sp>
+        <p:nvSpPr>
+          <p:cNvPr id="37" name="Ellipse 36"/>
+          <p:cNvSpPr/>
+          <p:nvPr/>
+        </p:nvSpPr>
+        <p:spPr>
+          <a:xfrm>
+            <a:off x="5420139" y="2413123"/>
+            <a:ext cx="516835" cy="490330"/>
+          </a:xfrm>
+          <a:prstGeom prst="ellipse">
+            <a:avLst/>
+          </a:prstGeom>
+          <a:solidFill>
+            <a:schemeClr val="bg1"/>
+          </a:solidFill>
+          <a:ln>
+            <a:solidFill>
+              <a:schemeClr val="tx1"/>
+            </a:solidFill>
+          </a:ln>
+        </p:spPr>
+        <p:style>
+          <a:lnRef idx="2">
+            <a:schemeClr val="accent1">
+              <a:shade val="50000"/>
+            </a:schemeClr>
+          </a:lnRef>
+          <a:fillRef idx="1">
+            <a:schemeClr val="accent1"/>
+          </a:fillRef>
+          <a:effectRef idx="0">
+            <a:schemeClr val="accent1"/>
+          </a:effectRef>
+          <a:fontRef idx="minor">
+            <a:schemeClr val="lt1"/>
+          </a:fontRef>
+        </p:style>
+        <p:txBody>
+          <a:bodyPr rtlCol="0" anchor="ctr"/>
+          <a:lstStyle/>
+          <a:p>
+            <a:pPr algn="ctr"/>
+            <a:r>
+              <a:rPr lang="fr-FR" dirty="0">
+                <a:solidFill>
+                  <a:schemeClr val="tx1"/>
+                </a:solidFill>
+              </a:rPr>
+              <a:t>4</a:t>
+            </a:r>
+          </a:p>
+        </p:txBody>
+      </p:sp>
+      <p:sp>
+        <p:nvSpPr>
+          <p:cNvPr id="39" name="ZoneTexte 38"/>
+          <p:cNvSpPr txBox="1"/>
+          <p:nvPr/>
+        </p:nvSpPr>
+        <p:spPr>
+          <a:xfrm>
+            <a:off x="3519613" y="1550823"/>
+            <a:ext cx="1247521" cy="369332"/>
+          </a:xfrm>
+          <a:prstGeom prst="rect">
+            <a:avLst/>
+          </a:prstGeom>
+          <a:noFill/>
+        </p:spPr>
+        <p:txBody>
+          <a:bodyPr wrap="none" rtlCol="0">
+            <a:spAutoFit/>
+          </a:bodyPr>
+          <a:lstStyle/>
+          <a:p>
+            <a:r>
+              <a:rPr lang="fr-FR" dirty="0" err="1"/>
+              <a:t>maBranche</a:t>
+            </a:r>
+            <a:endParaRPr lang="fr-FR" dirty="0"/>
+          </a:p>
+        </p:txBody>
+      </p:sp>
+      <p:sp>
+        <p:nvSpPr>
+          <p:cNvPr id="40" name="ZoneTexte 39"/>
+          <p:cNvSpPr txBox="1"/>
+          <p:nvPr/>
+        </p:nvSpPr>
+        <p:spPr>
+          <a:xfrm>
+            <a:off x="6473600" y="1577873"/>
+            <a:ext cx="2041008" cy="369332"/>
+          </a:xfrm>
+          <a:prstGeom prst="rect">
+            <a:avLst/>
+          </a:prstGeom>
+          <a:noFill/>
+        </p:spPr>
+        <p:txBody>
+          <a:bodyPr wrap="none" rtlCol="0">
+            <a:spAutoFit/>
+          </a:bodyPr>
+          <a:lstStyle/>
+          <a:p>
+            <a:r>
+              <a:rPr lang="fr-FR" dirty="0" err="1"/>
+              <a:t>laBranchePrincipale</a:t>
+            </a:r>
+            <a:endParaRPr lang="fr-FR" dirty="0"/>
+          </a:p>
+        </p:txBody>
+      </p:sp>
+    </p:spTree>
+    <p:extLst>
+      <p:ext uri="{BB962C8B-B14F-4D97-AF65-F5344CB8AC3E}">
+        <p14:creationId xmlns:p14="http://schemas.microsoft.com/office/powerpoint/2010/main" val="1034187598"/>
+      </p:ext>
+    </p:extLst>
+  </p:cSld>
+  <p:clrMapOvr>
+    <a:masterClrMapping/>
+  </p:clrMapOvr>
+</p:sld>
+</file>
+
+<file path=ppt/slides/slide22.xml><?xml version="1.0" encoding="utf-8"?>
+<p:sld xmlns:a="http://schemas.openxmlformats.org/drawingml/2006/main" xmlns:r="http://schemas.openxmlformats.org/officeDocument/2006/relationships" xmlns:p="http://schemas.openxmlformats.org/presentationml/2006/main">
+  <p:cSld>
+    <p:spTree>
+      <p:nvGrpSpPr>
+        <p:cNvPr id="1" name=""/>
+        <p:cNvGrpSpPr/>
+        <p:nvPr/>
+      </p:nvGrpSpPr>
+      <p:grpSpPr>
+        <a:xfrm>
+          <a:off x="0" y="0"/>
+          <a:ext cx="0" cy="0"/>
+          <a:chOff x="0" y="0"/>
+          <a:chExt cx="0" cy="0"/>
+        </a:xfrm>
+      </p:grpSpPr>
+      <p:sp>
+        <p:nvSpPr>
+          <p:cNvPr id="5" name="Subtitle 2"/>
+          <p:cNvSpPr txBox="1">
+            <a:spLocks/>
+          </p:cNvSpPr>
+          <p:nvPr/>
+        </p:nvSpPr>
+        <p:spPr>
+          <a:xfrm>
+            <a:off x="145774" y="665312"/>
+            <a:ext cx="11886701" cy="603448"/>
+          </a:xfrm>
+          <a:prstGeom prst="rect">
+            <a:avLst/>
+          </a:prstGeom>
+        </p:spPr>
+        <p:txBody>
+          <a:bodyPr vert="horz" lIns="91440" tIns="45720" rIns="91440" bIns="45720" rtlCol="0">
+            <a:noAutofit/>
+          </a:bodyPr>
+          <a:lstStyle>
+            <a:lvl1pPr marL="342900" indent="-342900" algn="l" defTabSz="914400" rtl="0" eaLnBrk="1" latinLnBrk="0" hangingPunct="1">
+              <a:spcBef>
+                <a:spcPct val="20000"/>
+              </a:spcBef>
+              <a:buFont typeface="Arial" pitchFamily="34" charset="0"/>
+              <a:buChar char="•"/>
+              <a:defRPr sz="3200" kern="1200">
+                <a:solidFill>
+                  <a:schemeClr val="tx1"/>
+                </a:solidFill>
+                <a:latin typeface="+mn-lt"/>
+                <a:ea typeface="+mn-ea"/>
+                <a:cs typeface="+mn-cs"/>
+              </a:defRPr>
+            </a:lvl1pPr>
+            <a:lvl2pPr marL="742950" indent="-285750" algn="l" defTabSz="914400" rtl="0" eaLnBrk="1" latinLnBrk="0" hangingPunct="1">
+              <a:spcBef>
+                <a:spcPct val="20000"/>
+              </a:spcBef>
+              <a:buFont typeface="Arial" pitchFamily="34" charset="0"/>
+              <a:buChar char="–"/>
+              <a:defRPr sz="2800" kern="1200">
+                <a:solidFill>
+                  <a:schemeClr val="tx1"/>
+                </a:solidFill>
+                <a:latin typeface="+mn-lt"/>
+                <a:ea typeface="+mn-ea"/>
+                <a:cs typeface="+mn-cs"/>
+              </a:defRPr>
+            </a:lvl2pPr>
+            <a:lvl3pPr marL="1143000" indent="-228600" algn="l" defTabSz="914400" rtl="0" eaLnBrk="1" latinLnBrk="0" hangingPunct="1">
+              <a:spcBef>
+                <a:spcPct val="20000"/>
+              </a:spcBef>
+              <a:buFont typeface="Arial" pitchFamily="34" charset="0"/>
+              <a:buChar char="•"/>
+              <a:defRPr sz="2400" kern="1200">
+                <a:solidFill>
+                  <a:schemeClr val="tx1"/>
+                </a:solidFill>
+                <a:latin typeface="+mn-lt"/>
+                <a:ea typeface="+mn-ea"/>
+                <a:cs typeface="+mn-cs"/>
+              </a:defRPr>
+            </a:lvl3pPr>
+            <a:lvl4pPr marL="1600200" indent="-228600" algn="l" defTabSz="914400" rtl="0" eaLnBrk="1" latinLnBrk="0" hangingPunct="1">
+              <a:spcBef>
+                <a:spcPct val="20000"/>
+              </a:spcBef>
+              <a:buFont typeface="Arial" pitchFamily="34" charset="0"/>
+              <a:buChar char="–"/>
+              <a:defRPr sz="2000" kern="1200">
+                <a:solidFill>
+                  <a:schemeClr val="tx1"/>
+                </a:solidFill>
+                <a:latin typeface="+mn-lt"/>
+                <a:ea typeface="+mn-ea"/>
+                <a:cs typeface="+mn-cs"/>
+              </a:defRPr>
+            </a:lvl4pPr>
+            <a:lvl5pPr marL="2057400" indent="-228600" algn="l" defTabSz="914400" rtl="0" eaLnBrk="1" latinLnBrk="0" hangingPunct="1">
+              <a:spcBef>
+                <a:spcPct val="20000"/>
+              </a:spcBef>
+              <a:buFont typeface="Arial" pitchFamily="34" charset="0"/>
+              <a:buChar char="»"/>
+              <a:defRPr sz="2000" kern="1200">
+                <a:solidFill>
+                  <a:schemeClr val="tx1"/>
+                </a:solidFill>
+                <a:latin typeface="+mn-lt"/>
+                <a:ea typeface="+mn-ea"/>
+                <a:cs typeface="+mn-cs"/>
+              </a:defRPr>
+            </a:lvl5pPr>
+            <a:lvl6pPr marL="2514600" indent="-228600" algn="l" defTabSz="914400" rtl="0" eaLnBrk="1" latinLnBrk="0" hangingPunct="1">
+              <a:spcBef>
+                <a:spcPct val="20000"/>
+              </a:spcBef>
+              <a:buFont typeface="Arial" pitchFamily="34" charset="0"/>
+              <a:buChar char="•"/>
+              <a:defRPr sz="2000" kern="1200">
+                <a:solidFill>
+                  <a:schemeClr val="tx1"/>
+                </a:solidFill>
+                <a:latin typeface="+mn-lt"/>
+                <a:ea typeface="+mn-ea"/>
+                <a:cs typeface="+mn-cs"/>
+              </a:defRPr>
+            </a:lvl6pPr>
+            <a:lvl7pPr marL="2971800" indent="-228600" algn="l" defTabSz="914400" rtl="0" eaLnBrk="1" latinLnBrk="0" hangingPunct="1">
+              <a:spcBef>
+                <a:spcPct val="20000"/>
+              </a:spcBef>
+              <a:buFont typeface="Arial" pitchFamily="34" charset="0"/>
+              <a:buChar char="•"/>
+              <a:defRPr sz="2000" kern="1200">
+                <a:solidFill>
+                  <a:schemeClr val="tx1"/>
+                </a:solidFill>
+                <a:latin typeface="+mn-lt"/>
+                <a:ea typeface="+mn-ea"/>
+                <a:cs typeface="+mn-cs"/>
+              </a:defRPr>
+            </a:lvl7pPr>
+            <a:lvl8pPr marL="3429000" indent="-228600" algn="l" defTabSz="914400" rtl="0" eaLnBrk="1" latinLnBrk="0" hangingPunct="1">
+              <a:spcBef>
+                <a:spcPct val="20000"/>
+              </a:spcBef>
+              <a:buFont typeface="Arial" pitchFamily="34" charset="0"/>
+              <a:buChar char="•"/>
+              <a:defRPr sz="2000" kern="1200">
+                <a:solidFill>
+                  <a:schemeClr val="tx1"/>
+                </a:solidFill>
+                <a:latin typeface="+mn-lt"/>
+                <a:ea typeface="+mn-ea"/>
+                <a:cs typeface="+mn-cs"/>
+              </a:defRPr>
+            </a:lvl8pPr>
+            <a:lvl9pPr marL="3886200" indent="-228600" algn="l" defTabSz="914400" rtl="0" eaLnBrk="1" latinLnBrk="0" hangingPunct="1">
+              <a:spcBef>
+                <a:spcPct val="20000"/>
+              </a:spcBef>
+              <a:buFont typeface="Arial" pitchFamily="34" charset="0"/>
+              <a:buChar char="•"/>
+              <a:defRPr sz="2000" kern="1200">
+                <a:solidFill>
+                  <a:schemeClr val="tx1"/>
+                </a:solidFill>
+                <a:latin typeface="+mn-lt"/>
+                <a:ea typeface="+mn-ea"/>
+                <a:cs typeface="+mn-cs"/>
+              </a:defRPr>
+            </a:lvl9pPr>
+          </a:lstStyle>
+          <a:p>
+            <a:pPr marL="0" indent="0">
+              <a:buNone/>
+            </a:pPr>
+            <a:r>
+              <a:rPr lang="en-US" sz="4000" b="1" spc="-150" dirty="0">
+                <a:solidFill>
+                  <a:srgbClr val="F5C24C"/>
+                </a:solidFill>
+                <a:latin typeface="Signika Negative" pitchFamily="2" charset="0"/>
+                <a:ea typeface="Franchise" pitchFamily="49" charset="0"/>
+              </a:rPr>
+              <a:t>*</a:t>
+            </a:r>
+            <a:r>
+              <a:rPr lang="en-US" sz="4000" b="1" spc="-150" dirty="0">
+                <a:solidFill>
+                  <a:schemeClr val="tx1">
+                    <a:lumMod val="65000"/>
+                    <a:lumOff val="35000"/>
+                  </a:schemeClr>
+                </a:solidFill>
+                <a:latin typeface="Signika Negative" pitchFamily="2" charset="0"/>
+                <a:ea typeface="Franchise" pitchFamily="49" charset="0"/>
+              </a:rPr>
+              <a:t> </a:t>
+            </a:r>
+            <a:r>
+              <a:rPr lang="en-US" sz="4000" b="1" spc="-150" dirty="0" err="1">
+                <a:solidFill>
+                  <a:schemeClr val="tx1">
+                    <a:lumMod val="65000"/>
+                    <a:lumOff val="35000"/>
+                  </a:schemeClr>
+                </a:solidFill>
+                <a:latin typeface="Signika Negative" pitchFamily="2" charset="0"/>
+                <a:ea typeface="Franchise" pitchFamily="49" charset="0"/>
+              </a:rPr>
+              <a:t>Etape</a:t>
+            </a:r>
+            <a:r>
+              <a:rPr lang="en-US" sz="4000" b="1" spc="-150" dirty="0">
+                <a:solidFill>
+                  <a:schemeClr val="tx1">
+                    <a:lumMod val="65000"/>
+                    <a:lumOff val="35000"/>
+                  </a:schemeClr>
+                </a:solidFill>
+                <a:latin typeface="Signika Negative" pitchFamily="2" charset="0"/>
+                <a:ea typeface="Franchise" pitchFamily="49" charset="0"/>
+              </a:rPr>
+              <a:t> 1 : </a:t>
+            </a:r>
+            <a:r>
+              <a:rPr lang="en-US" sz="4000" b="1" spc="-150" dirty="0" err="1">
+                <a:solidFill>
+                  <a:schemeClr val="tx1">
+                    <a:lumMod val="65000"/>
+                    <a:lumOff val="35000"/>
+                  </a:schemeClr>
+                </a:solidFill>
+                <a:latin typeface="Signika Negative" pitchFamily="2" charset="0"/>
+                <a:ea typeface="Franchise" pitchFamily="49" charset="0"/>
+              </a:rPr>
+              <a:t>création</a:t>
+            </a:r>
+            <a:r>
+              <a:rPr lang="en-US" sz="4000" b="1" spc="-150" dirty="0">
+                <a:solidFill>
+                  <a:schemeClr val="tx1">
+                    <a:lumMod val="65000"/>
+                    <a:lumOff val="35000"/>
+                  </a:schemeClr>
+                </a:solidFill>
+                <a:latin typeface="Signika Negative" pitchFamily="2" charset="0"/>
+                <a:ea typeface="Franchise" pitchFamily="49" charset="0"/>
+              </a:rPr>
+              <a:t> de la </a:t>
+            </a:r>
+            <a:r>
+              <a:rPr lang="en-US" sz="4000" b="1" spc="-150" dirty="0" err="1">
+                <a:solidFill>
+                  <a:schemeClr val="tx1">
+                    <a:lumMod val="65000"/>
+                    <a:lumOff val="35000"/>
+                  </a:schemeClr>
+                </a:solidFill>
+                <a:latin typeface="Signika Negative" pitchFamily="2" charset="0"/>
+                <a:ea typeface="Franchise" pitchFamily="49" charset="0"/>
+              </a:rPr>
+              <a:t>branche</a:t>
+            </a:r>
+            <a:endParaRPr lang="en-US" sz="4000" b="1" spc="-150" dirty="0">
+              <a:solidFill>
+                <a:schemeClr val="tx1">
+                  <a:lumMod val="65000"/>
+                  <a:lumOff val="35000"/>
+                </a:schemeClr>
+              </a:solidFill>
+              <a:latin typeface="Signika Negative" pitchFamily="2" charset="0"/>
+              <a:ea typeface="Franchise" pitchFamily="49" charset="0"/>
+            </a:endParaRPr>
+          </a:p>
+        </p:txBody>
+      </p:sp>
+      <p:sp>
+        <p:nvSpPr>
+          <p:cNvPr id="6" name="Flowchart: Off-page Connector 29"/>
+          <p:cNvSpPr/>
+          <p:nvPr/>
+        </p:nvSpPr>
+        <p:spPr>
+          <a:xfrm>
+            <a:off x="11526790" y="123637"/>
+            <a:ext cx="505685" cy="313685"/>
+          </a:xfrm>
+          <a:prstGeom prst="flowChartOffpageConnector">
+            <a:avLst/>
+          </a:prstGeom>
+          <a:solidFill>
+            <a:srgbClr val="F5C24C"/>
+          </a:solidFill>
+          <a:ln w="6350">
+            <a:noFill/>
+          </a:ln>
+        </p:spPr>
+        <p:style>
+          <a:lnRef idx="2">
+            <a:schemeClr val="accent1">
+              <a:shade val="50000"/>
+            </a:schemeClr>
+          </a:lnRef>
+          <a:fillRef idx="1">
+            <a:schemeClr val="accent1"/>
+          </a:fillRef>
+          <a:effectRef idx="0">
+            <a:schemeClr val="accent1"/>
+          </a:effectRef>
+          <a:fontRef idx="minor">
+            <a:schemeClr val="lt1"/>
+          </a:fontRef>
+        </p:style>
+        <p:txBody>
+          <a:bodyPr rtlCol="0" anchor="ctr"/>
+          <a:lstStyle/>
+          <a:p>
+            <a:pPr algn="ctr"/>
+            <a:r>
+              <a:rPr lang="en-US" sz="1200" b="1" dirty="0"/>
+              <a:t>21</a:t>
+            </a:r>
+          </a:p>
+        </p:txBody>
+      </p:sp>
+      <p:sp>
+        <p:nvSpPr>
+          <p:cNvPr id="21" name="Rectangle 20"/>
+          <p:cNvSpPr/>
+          <p:nvPr/>
+        </p:nvSpPr>
+        <p:spPr>
+          <a:xfrm>
+            <a:off x="0" y="1712723"/>
+            <a:ext cx="12220790" cy="4968279"/>
+          </a:xfrm>
+          <a:prstGeom prst="rect">
+            <a:avLst/>
+          </a:prstGeom>
+          <a:pattFill prst="pct90">
+            <a:fgClr>
+              <a:srgbClr val="F5C24C"/>
+            </a:fgClr>
+            <a:bgClr>
+              <a:srgbClr val="FFCC00"/>
+            </a:bgClr>
+          </a:pattFill>
+          <a:ln>
+            <a:noFill/>
+          </a:ln>
+        </p:spPr>
+        <p:style>
+          <a:lnRef idx="2">
+            <a:schemeClr val="accent1">
+              <a:shade val="50000"/>
+            </a:schemeClr>
+          </a:lnRef>
+          <a:fillRef idx="1">
+            <a:schemeClr val="accent1"/>
+          </a:fillRef>
+          <a:effectRef idx="0">
+            <a:schemeClr val="accent1"/>
+          </a:effectRef>
+          <a:fontRef idx="minor">
+            <a:schemeClr val="lt1"/>
+          </a:fontRef>
+        </p:style>
+        <p:txBody>
+          <a:bodyPr rtlCol="0" anchor="ctr"/>
+          <a:lstStyle/>
+          <a:p>
+            <a:pPr algn="ctr"/>
+            <a:endParaRPr kumimoji="0" lang="fr-FR" altLang="fr-FR" sz="4800" b="1" i="0" u="none" strike="noStrike" cap="none" normalizeH="0" baseline="0" dirty="0">
+              <a:ln>
+                <a:noFill/>
+              </a:ln>
+              <a:solidFill>
+                <a:schemeClr val="bg1"/>
+              </a:solidFill>
+              <a:effectLst/>
+              <a:latin typeface="+mj-lt"/>
+            </a:endParaRPr>
+          </a:p>
+        </p:txBody>
+      </p:sp>
+      <p:sp>
+        <p:nvSpPr>
+          <p:cNvPr id="23" name="ZoneTexte 22"/>
+          <p:cNvSpPr txBox="1"/>
+          <p:nvPr/>
+        </p:nvSpPr>
+        <p:spPr>
+          <a:xfrm>
+            <a:off x="3675923" y="3242755"/>
+            <a:ext cx="4261744" cy="1384995"/>
+          </a:xfrm>
+          <a:prstGeom prst="rect">
+            <a:avLst/>
+          </a:prstGeom>
+          <a:noFill/>
+        </p:spPr>
+        <p:txBody>
+          <a:bodyPr wrap="none" rtlCol="0">
+            <a:spAutoFit/>
+          </a:bodyPr>
+          <a:lstStyle/>
+          <a:p>
+            <a:r>
+              <a:rPr lang="fr-FR" sz="2800" dirty="0">
+                <a:solidFill>
+                  <a:schemeClr val="bg1"/>
+                </a:solidFill>
+              </a:rPr>
+              <a:t>git </a:t>
+            </a:r>
+            <a:r>
+              <a:rPr lang="fr-FR" sz="2800" dirty="0" err="1">
+                <a:solidFill>
+                  <a:schemeClr val="bg1"/>
+                </a:solidFill>
+              </a:rPr>
+              <a:t>checkout</a:t>
+            </a:r>
+            <a:r>
+              <a:rPr lang="fr-FR" sz="2800" dirty="0">
+                <a:solidFill>
+                  <a:schemeClr val="bg1"/>
+                </a:solidFill>
+              </a:rPr>
+              <a:t> –b </a:t>
+            </a:r>
+            <a:r>
+              <a:rPr lang="fr-FR" sz="2800" dirty="0" err="1">
+                <a:solidFill>
+                  <a:schemeClr val="bg1"/>
+                </a:solidFill>
+              </a:rPr>
+              <a:t>mabranch</a:t>
+            </a:r>
+            <a:endParaRPr lang="fr-FR" sz="2800" dirty="0">
+              <a:solidFill>
+                <a:schemeClr val="bg1"/>
+              </a:solidFill>
+            </a:endParaRPr>
+          </a:p>
+          <a:p>
+            <a:endParaRPr lang="fr-FR" sz="2800" dirty="0">
+              <a:solidFill>
+                <a:schemeClr val="bg1"/>
+              </a:solidFill>
+            </a:endParaRPr>
+          </a:p>
+          <a:p>
+            <a:r>
+              <a:rPr lang="fr-FR" sz="2800" dirty="0">
+                <a:solidFill>
+                  <a:schemeClr val="bg1"/>
+                </a:solidFill>
+              </a:rPr>
+              <a:t>git push –u </a:t>
+            </a:r>
+            <a:r>
+              <a:rPr lang="fr-FR" sz="2800" dirty="0" err="1">
+                <a:solidFill>
+                  <a:schemeClr val="bg1"/>
+                </a:solidFill>
+              </a:rPr>
+              <a:t>origin</a:t>
+            </a:r>
+            <a:r>
+              <a:rPr lang="fr-FR" sz="2800" dirty="0">
+                <a:solidFill>
+                  <a:schemeClr val="bg1"/>
+                </a:solidFill>
+              </a:rPr>
+              <a:t> </a:t>
+            </a:r>
+            <a:r>
+              <a:rPr lang="fr-FR" sz="2800" dirty="0" err="1">
+                <a:solidFill>
+                  <a:schemeClr val="bg1"/>
+                </a:solidFill>
+              </a:rPr>
+              <a:t>mabranch</a:t>
+            </a:r>
+            <a:endParaRPr lang="fr-FR" sz="2800" dirty="0">
+              <a:solidFill>
+                <a:schemeClr val="bg1"/>
+              </a:solidFill>
+            </a:endParaRPr>
+          </a:p>
+        </p:txBody>
+      </p:sp>
+    </p:spTree>
+    <p:extLst>
+      <p:ext uri="{BB962C8B-B14F-4D97-AF65-F5344CB8AC3E}">
+        <p14:creationId xmlns:p14="http://schemas.microsoft.com/office/powerpoint/2010/main" val="1727577083"/>
+      </p:ext>
+    </p:extLst>
+  </p:cSld>
+  <p:clrMapOvr>
+    <a:masterClrMapping/>
+  </p:clrMapOvr>
+</p:sld>
+</file>
+
+<file path=ppt/slides/slide23.xml><?xml version="1.0" encoding="utf-8"?>
+<p:sld xmlns:a="http://schemas.openxmlformats.org/drawingml/2006/main" xmlns:r="http://schemas.openxmlformats.org/officeDocument/2006/relationships" xmlns:p="http://schemas.openxmlformats.org/presentationml/2006/main">
+  <p:cSld>
+    <p:spTree>
+      <p:nvGrpSpPr>
+        <p:cNvPr id="1" name=""/>
+        <p:cNvGrpSpPr/>
+        <p:nvPr/>
+      </p:nvGrpSpPr>
+      <p:grpSpPr>
+        <a:xfrm>
+          <a:off x="0" y="0"/>
+          <a:ext cx="0" cy="0"/>
+          <a:chOff x="0" y="0"/>
+          <a:chExt cx="0" cy="0"/>
+        </a:xfrm>
+      </p:grpSpPr>
+      <p:sp>
+        <p:nvSpPr>
+          <p:cNvPr id="5" name="Subtitle 2"/>
+          <p:cNvSpPr txBox="1">
+            <a:spLocks/>
+          </p:cNvSpPr>
+          <p:nvPr/>
+        </p:nvSpPr>
+        <p:spPr>
+          <a:xfrm>
+            <a:off x="145774" y="665312"/>
+            <a:ext cx="11886701" cy="603448"/>
+          </a:xfrm>
+          <a:prstGeom prst="rect">
+            <a:avLst/>
+          </a:prstGeom>
+        </p:spPr>
+        <p:txBody>
+          <a:bodyPr vert="horz" lIns="91440" tIns="45720" rIns="91440" bIns="45720" rtlCol="0">
+            <a:noAutofit/>
+          </a:bodyPr>
+          <a:lstStyle>
+            <a:lvl1pPr marL="342900" indent="-342900" algn="l" defTabSz="914400" rtl="0" eaLnBrk="1" latinLnBrk="0" hangingPunct="1">
+              <a:spcBef>
+                <a:spcPct val="20000"/>
+              </a:spcBef>
+              <a:buFont typeface="Arial" pitchFamily="34" charset="0"/>
+              <a:buChar char="•"/>
+              <a:defRPr sz="3200" kern="1200">
+                <a:solidFill>
+                  <a:schemeClr val="tx1"/>
+                </a:solidFill>
+                <a:latin typeface="+mn-lt"/>
+                <a:ea typeface="+mn-ea"/>
+                <a:cs typeface="+mn-cs"/>
+              </a:defRPr>
+            </a:lvl1pPr>
+            <a:lvl2pPr marL="742950" indent="-285750" algn="l" defTabSz="914400" rtl="0" eaLnBrk="1" latinLnBrk="0" hangingPunct="1">
+              <a:spcBef>
+                <a:spcPct val="20000"/>
+              </a:spcBef>
+              <a:buFont typeface="Arial" pitchFamily="34" charset="0"/>
+              <a:buChar char="–"/>
+              <a:defRPr sz="2800" kern="1200">
+                <a:solidFill>
+                  <a:schemeClr val="tx1"/>
+                </a:solidFill>
+                <a:latin typeface="+mn-lt"/>
+                <a:ea typeface="+mn-ea"/>
+                <a:cs typeface="+mn-cs"/>
+              </a:defRPr>
+            </a:lvl2pPr>
+            <a:lvl3pPr marL="1143000" indent="-228600" algn="l" defTabSz="914400" rtl="0" eaLnBrk="1" latinLnBrk="0" hangingPunct="1">
+              <a:spcBef>
+                <a:spcPct val="20000"/>
+              </a:spcBef>
+              <a:buFont typeface="Arial" pitchFamily="34" charset="0"/>
+              <a:buChar char="•"/>
+              <a:defRPr sz="2400" kern="1200">
+                <a:solidFill>
+                  <a:schemeClr val="tx1"/>
+                </a:solidFill>
+                <a:latin typeface="+mn-lt"/>
+                <a:ea typeface="+mn-ea"/>
+                <a:cs typeface="+mn-cs"/>
+              </a:defRPr>
+            </a:lvl3pPr>
+            <a:lvl4pPr marL="1600200" indent="-228600" algn="l" defTabSz="914400" rtl="0" eaLnBrk="1" latinLnBrk="0" hangingPunct="1">
+              <a:spcBef>
+                <a:spcPct val="20000"/>
+              </a:spcBef>
+              <a:buFont typeface="Arial" pitchFamily="34" charset="0"/>
+              <a:buChar char="–"/>
+              <a:defRPr sz="2000" kern="1200">
+                <a:solidFill>
+                  <a:schemeClr val="tx1"/>
+                </a:solidFill>
+                <a:latin typeface="+mn-lt"/>
+                <a:ea typeface="+mn-ea"/>
+                <a:cs typeface="+mn-cs"/>
+              </a:defRPr>
+            </a:lvl4pPr>
+            <a:lvl5pPr marL="2057400" indent="-228600" algn="l" defTabSz="914400" rtl="0" eaLnBrk="1" latinLnBrk="0" hangingPunct="1">
+              <a:spcBef>
+                <a:spcPct val="20000"/>
+              </a:spcBef>
+              <a:buFont typeface="Arial" pitchFamily="34" charset="0"/>
+              <a:buChar char="»"/>
+              <a:defRPr sz="2000" kern="1200">
+                <a:solidFill>
+                  <a:schemeClr val="tx1"/>
+                </a:solidFill>
+                <a:latin typeface="+mn-lt"/>
+                <a:ea typeface="+mn-ea"/>
+                <a:cs typeface="+mn-cs"/>
+              </a:defRPr>
+            </a:lvl5pPr>
+            <a:lvl6pPr marL="2514600" indent="-228600" algn="l" defTabSz="914400" rtl="0" eaLnBrk="1" latinLnBrk="0" hangingPunct="1">
+              <a:spcBef>
+                <a:spcPct val="20000"/>
+              </a:spcBef>
+              <a:buFont typeface="Arial" pitchFamily="34" charset="0"/>
+              <a:buChar char="•"/>
+              <a:defRPr sz="2000" kern="1200">
+                <a:solidFill>
+                  <a:schemeClr val="tx1"/>
+                </a:solidFill>
+                <a:latin typeface="+mn-lt"/>
+                <a:ea typeface="+mn-ea"/>
+                <a:cs typeface="+mn-cs"/>
+              </a:defRPr>
+            </a:lvl6pPr>
+            <a:lvl7pPr marL="2971800" indent="-228600" algn="l" defTabSz="914400" rtl="0" eaLnBrk="1" latinLnBrk="0" hangingPunct="1">
+              <a:spcBef>
+                <a:spcPct val="20000"/>
+              </a:spcBef>
+              <a:buFont typeface="Arial" pitchFamily="34" charset="0"/>
+              <a:buChar char="•"/>
+              <a:defRPr sz="2000" kern="1200">
+                <a:solidFill>
+                  <a:schemeClr val="tx1"/>
+                </a:solidFill>
+                <a:latin typeface="+mn-lt"/>
+                <a:ea typeface="+mn-ea"/>
+                <a:cs typeface="+mn-cs"/>
+              </a:defRPr>
+            </a:lvl7pPr>
+            <a:lvl8pPr marL="3429000" indent="-228600" algn="l" defTabSz="914400" rtl="0" eaLnBrk="1" latinLnBrk="0" hangingPunct="1">
+              <a:spcBef>
+                <a:spcPct val="20000"/>
+              </a:spcBef>
+              <a:buFont typeface="Arial" pitchFamily="34" charset="0"/>
+              <a:buChar char="•"/>
+              <a:defRPr sz="2000" kern="1200">
+                <a:solidFill>
+                  <a:schemeClr val="tx1"/>
+                </a:solidFill>
+                <a:latin typeface="+mn-lt"/>
+                <a:ea typeface="+mn-ea"/>
+                <a:cs typeface="+mn-cs"/>
+              </a:defRPr>
+            </a:lvl8pPr>
+            <a:lvl9pPr marL="3886200" indent="-228600" algn="l" defTabSz="914400" rtl="0" eaLnBrk="1" latinLnBrk="0" hangingPunct="1">
+              <a:spcBef>
+                <a:spcPct val="20000"/>
+              </a:spcBef>
+              <a:buFont typeface="Arial" pitchFamily="34" charset="0"/>
+              <a:buChar char="•"/>
+              <a:defRPr sz="2000" kern="1200">
+                <a:solidFill>
+                  <a:schemeClr val="tx1"/>
+                </a:solidFill>
+                <a:latin typeface="+mn-lt"/>
+                <a:ea typeface="+mn-ea"/>
+                <a:cs typeface="+mn-cs"/>
+              </a:defRPr>
+            </a:lvl9pPr>
+          </a:lstStyle>
+          <a:p>
+            <a:pPr marL="0" indent="0">
+              <a:buNone/>
+            </a:pPr>
+            <a:r>
+              <a:rPr lang="en-US" sz="4000" b="1" spc="-150" dirty="0">
+                <a:solidFill>
+                  <a:srgbClr val="F5C24C"/>
+                </a:solidFill>
+                <a:latin typeface="Signika Negative" pitchFamily="2" charset="0"/>
+                <a:ea typeface="Franchise" pitchFamily="49" charset="0"/>
+              </a:rPr>
+              <a:t>*</a:t>
+            </a:r>
+            <a:r>
+              <a:rPr lang="en-US" sz="4000" b="1" spc="-150" dirty="0">
+                <a:solidFill>
+                  <a:schemeClr val="tx1">
+                    <a:lumMod val="65000"/>
+                    <a:lumOff val="35000"/>
+                  </a:schemeClr>
+                </a:solidFill>
+                <a:latin typeface="Signika Negative" pitchFamily="2" charset="0"/>
+                <a:ea typeface="Franchise" pitchFamily="49" charset="0"/>
+              </a:rPr>
+              <a:t> </a:t>
+            </a:r>
+            <a:r>
+              <a:rPr lang="en-US" sz="4000" b="1" spc="-150" dirty="0" err="1">
+                <a:solidFill>
+                  <a:schemeClr val="tx1">
+                    <a:lumMod val="65000"/>
+                    <a:lumOff val="35000"/>
+                  </a:schemeClr>
+                </a:solidFill>
+                <a:latin typeface="Signika Negative" pitchFamily="2" charset="0"/>
+                <a:ea typeface="Franchise" pitchFamily="49" charset="0"/>
+              </a:rPr>
+              <a:t>Etape</a:t>
+            </a:r>
+            <a:r>
+              <a:rPr lang="en-US" sz="4000" b="1" spc="-150" dirty="0">
+                <a:solidFill>
+                  <a:schemeClr val="tx1">
+                    <a:lumMod val="65000"/>
+                    <a:lumOff val="35000"/>
+                  </a:schemeClr>
+                </a:solidFill>
+                <a:latin typeface="Signika Negative" pitchFamily="2" charset="0"/>
+                <a:ea typeface="Franchise" pitchFamily="49" charset="0"/>
+              </a:rPr>
+              <a:t> 2 : </a:t>
+            </a:r>
+            <a:r>
+              <a:rPr lang="en-US" sz="4000" b="1" spc="-150" dirty="0" err="1">
+                <a:solidFill>
+                  <a:schemeClr val="tx1">
+                    <a:lumMod val="65000"/>
+                    <a:lumOff val="35000"/>
+                  </a:schemeClr>
+                </a:solidFill>
+                <a:latin typeface="Signika Negative" pitchFamily="2" charset="0"/>
+                <a:ea typeface="Franchise" pitchFamily="49" charset="0"/>
+              </a:rPr>
+              <a:t>création</a:t>
+            </a:r>
+            <a:r>
+              <a:rPr lang="en-US" sz="4000" b="1" spc="-150" dirty="0">
+                <a:solidFill>
+                  <a:schemeClr val="tx1">
+                    <a:lumMod val="65000"/>
+                    <a:lumOff val="35000"/>
+                  </a:schemeClr>
+                </a:solidFill>
+                <a:latin typeface="Signika Negative" pitchFamily="2" charset="0"/>
+                <a:ea typeface="Franchise" pitchFamily="49" charset="0"/>
+              </a:rPr>
+              <a:t> d’un commit</a:t>
+            </a:r>
+          </a:p>
+        </p:txBody>
+      </p:sp>
+      <p:sp>
+        <p:nvSpPr>
+          <p:cNvPr id="6" name="Flowchart: Off-page Connector 29"/>
+          <p:cNvSpPr/>
+          <p:nvPr/>
+        </p:nvSpPr>
+        <p:spPr>
+          <a:xfrm>
+            <a:off x="11526790" y="123637"/>
+            <a:ext cx="505685" cy="313685"/>
+          </a:xfrm>
+          <a:prstGeom prst="flowChartOffpageConnector">
+            <a:avLst/>
+          </a:prstGeom>
+          <a:solidFill>
+            <a:srgbClr val="F5C24C"/>
+          </a:solidFill>
+          <a:ln w="6350">
+            <a:noFill/>
+          </a:ln>
+        </p:spPr>
+        <p:style>
+          <a:lnRef idx="2">
+            <a:schemeClr val="accent1">
+              <a:shade val="50000"/>
+            </a:schemeClr>
+          </a:lnRef>
+          <a:fillRef idx="1">
+            <a:schemeClr val="accent1"/>
+          </a:fillRef>
+          <a:effectRef idx="0">
+            <a:schemeClr val="accent1"/>
+          </a:effectRef>
+          <a:fontRef idx="minor">
+            <a:schemeClr val="lt1"/>
+          </a:fontRef>
+        </p:style>
+        <p:txBody>
+          <a:bodyPr rtlCol="0" anchor="ctr"/>
+          <a:lstStyle/>
+          <a:p>
+            <a:pPr algn="ctr"/>
+            <a:r>
+              <a:rPr lang="en-US" sz="1200" b="1" dirty="0"/>
+              <a:t>22</a:t>
+            </a:r>
+          </a:p>
+        </p:txBody>
+      </p:sp>
+      <p:sp>
+        <p:nvSpPr>
+          <p:cNvPr id="21" name="Rectangle 20"/>
+          <p:cNvSpPr/>
+          <p:nvPr/>
+        </p:nvSpPr>
+        <p:spPr>
+          <a:xfrm>
+            <a:off x="0" y="1712723"/>
+            <a:ext cx="12220790" cy="4968279"/>
+          </a:xfrm>
+          <a:prstGeom prst="rect">
+            <a:avLst/>
+          </a:prstGeom>
+          <a:pattFill prst="pct90">
+            <a:fgClr>
+              <a:srgbClr val="F5C24C"/>
+            </a:fgClr>
+            <a:bgClr>
+              <a:srgbClr val="FFCC00"/>
+            </a:bgClr>
+          </a:pattFill>
+          <a:ln>
+            <a:noFill/>
+          </a:ln>
+        </p:spPr>
+        <p:style>
+          <a:lnRef idx="2">
+            <a:schemeClr val="accent1">
+              <a:shade val="50000"/>
+            </a:schemeClr>
+          </a:lnRef>
+          <a:fillRef idx="1">
+            <a:schemeClr val="accent1"/>
+          </a:fillRef>
+          <a:effectRef idx="0">
+            <a:schemeClr val="accent1"/>
+          </a:effectRef>
+          <a:fontRef idx="minor">
+            <a:schemeClr val="lt1"/>
+          </a:fontRef>
+        </p:style>
+        <p:txBody>
+          <a:bodyPr rtlCol="0" anchor="ctr"/>
+          <a:lstStyle/>
+          <a:p>
+            <a:pPr algn="ctr"/>
+            <a:endParaRPr kumimoji="0" lang="fr-FR" altLang="fr-FR" sz="4800" b="1" i="0" u="none" strike="noStrike" cap="none" normalizeH="0" baseline="0" dirty="0">
+              <a:ln>
+                <a:noFill/>
+              </a:ln>
+              <a:solidFill>
+                <a:schemeClr val="bg1"/>
+              </a:solidFill>
+              <a:effectLst/>
+              <a:latin typeface="+mj-lt"/>
+            </a:endParaRPr>
+          </a:p>
+        </p:txBody>
+      </p:sp>
+      <p:sp>
+        <p:nvSpPr>
+          <p:cNvPr id="23" name="ZoneTexte 22"/>
+          <p:cNvSpPr txBox="1"/>
+          <p:nvPr/>
+        </p:nvSpPr>
+        <p:spPr>
+          <a:xfrm>
+            <a:off x="3675923" y="3242755"/>
+            <a:ext cx="6183694" cy="2246769"/>
+          </a:xfrm>
+          <a:prstGeom prst="rect">
+            <a:avLst/>
+          </a:prstGeom>
+          <a:noFill/>
+        </p:spPr>
+        <p:txBody>
+          <a:bodyPr wrap="square" rtlCol="0">
+            <a:spAutoFit/>
+          </a:bodyPr>
+          <a:lstStyle/>
+          <a:p>
+            <a:r>
+              <a:rPr lang="fr-FR" sz="2800" dirty="0">
+                <a:solidFill>
+                  <a:schemeClr val="bg1"/>
+                </a:solidFill>
+              </a:rPr>
+              <a:t>git </a:t>
+            </a:r>
+            <a:r>
+              <a:rPr lang="fr-FR" sz="2800" dirty="0" err="1">
+                <a:solidFill>
+                  <a:schemeClr val="bg1"/>
+                </a:solidFill>
+              </a:rPr>
+              <a:t>add</a:t>
+            </a:r>
+            <a:r>
+              <a:rPr lang="fr-FR" sz="2800" dirty="0">
+                <a:solidFill>
+                  <a:schemeClr val="bg1"/>
+                </a:solidFill>
+              </a:rPr>
+              <a:t> .</a:t>
+            </a:r>
+            <a:br>
+              <a:rPr lang="fr-FR" sz="2800" dirty="0">
+                <a:solidFill>
+                  <a:schemeClr val="bg1"/>
+                </a:solidFill>
+              </a:rPr>
+            </a:br>
+            <a:endParaRPr lang="fr-FR" sz="2800" dirty="0">
+              <a:solidFill>
+                <a:schemeClr val="bg1"/>
+              </a:solidFill>
+            </a:endParaRPr>
+          </a:p>
+          <a:p>
+            <a:r>
+              <a:rPr lang="fr-FR" sz="2800" dirty="0">
+                <a:solidFill>
+                  <a:schemeClr val="bg1"/>
+                </a:solidFill>
+              </a:rPr>
+              <a:t>git commit –m « Message »</a:t>
+            </a:r>
+          </a:p>
+          <a:p>
+            <a:endParaRPr lang="fr-FR" sz="2800" dirty="0">
+              <a:solidFill>
+                <a:schemeClr val="bg1"/>
+              </a:solidFill>
+            </a:endParaRPr>
+          </a:p>
+          <a:p>
+            <a:r>
+              <a:rPr lang="fr-FR" sz="2800" dirty="0">
+                <a:solidFill>
+                  <a:schemeClr val="bg1"/>
+                </a:solidFill>
+              </a:rPr>
+              <a:t>git push</a:t>
+            </a:r>
+          </a:p>
+        </p:txBody>
+      </p:sp>
+    </p:spTree>
+    <p:extLst>
+      <p:ext uri="{BB962C8B-B14F-4D97-AF65-F5344CB8AC3E}">
+        <p14:creationId xmlns:p14="http://schemas.microsoft.com/office/powerpoint/2010/main" val="1689574366"/>
+      </p:ext>
+    </p:extLst>
+  </p:cSld>
+  <p:clrMapOvr>
+    <a:masterClrMapping/>
+  </p:clrMapOvr>
+</p:sld>
+</file>
+
+<file path=ppt/slides/slide24.xml><?xml version="1.0" encoding="utf-8"?>
+<p:sld xmlns:a="http://schemas.openxmlformats.org/drawingml/2006/main" xmlns:r="http://schemas.openxmlformats.org/officeDocument/2006/relationships" xmlns:p="http://schemas.openxmlformats.org/presentationml/2006/main">
+  <p:cSld>
+    <p:spTree>
+      <p:nvGrpSpPr>
+        <p:cNvPr id="1" name=""/>
+        <p:cNvGrpSpPr/>
+        <p:nvPr/>
+      </p:nvGrpSpPr>
+      <p:grpSpPr>
+        <a:xfrm>
+          <a:off x="0" y="0"/>
+          <a:ext cx="0" cy="0"/>
+          <a:chOff x="0" y="0"/>
+          <a:chExt cx="0" cy="0"/>
+        </a:xfrm>
+      </p:grpSpPr>
+      <p:sp>
+        <p:nvSpPr>
+          <p:cNvPr id="5" name="Subtitle 2"/>
+          <p:cNvSpPr txBox="1">
+            <a:spLocks/>
+          </p:cNvSpPr>
+          <p:nvPr/>
+        </p:nvSpPr>
+        <p:spPr>
+          <a:xfrm>
+            <a:off x="145774" y="665312"/>
+            <a:ext cx="11886701" cy="603448"/>
+          </a:xfrm>
+          <a:prstGeom prst="rect">
+            <a:avLst/>
+          </a:prstGeom>
+        </p:spPr>
+        <p:txBody>
+          <a:bodyPr vert="horz" lIns="91440" tIns="45720" rIns="91440" bIns="45720" rtlCol="0">
+            <a:noAutofit/>
+          </a:bodyPr>
+          <a:lstStyle>
+            <a:lvl1pPr marL="342900" indent="-342900" algn="l" defTabSz="914400" rtl="0" eaLnBrk="1" latinLnBrk="0" hangingPunct="1">
+              <a:spcBef>
+                <a:spcPct val="20000"/>
+              </a:spcBef>
+              <a:buFont typeface="Arial" pitchFamily="34" charset="0"/>
+              <a:buChar char="•"/>
+              <a:defRPr sz="3200" kern="1200">
+                <a:solidFill>
+                  <a:schemeClr val="tx1"/>
+                </a:solidFill>
+                <a:latin typeface="+mn-lt"/>
+                <a:ea typeface="+mn-ea"/>
+                <a:cs typeface="+mn-cs"/>
+              </a:defRPr>
+            </a:lvl1pPr>
+            <a:lvl2pPr marL="742950" indent="-285750" algn="l" defTabSz="914400" rtl="0" eaLnBrk="1" latinLnBrk="0" hangingPunct="1">
+              <a:spcBef>
+                <a:spcPct val="20000"/>
+              </a:spcBef>
+              <a:buFont typeface="Arial" pitchFamily="34" charset="0"/>
+              <a:buChar char="–"/>
+              <a:defRPr sz="2800" kern="1200">
+                <a:solidFill>
+                  <a:schemeClr val="tx1"/>
+                </a:solidFill>
+                <a:latin typeface="+mn-lt"/>
+                <a:ea typeface="+mn-ea"/>
+                <a:cs typeface="+mn-cs"/>
+              </a:defRPr>
+            </a:lvl2pPr>
+            <a:lvl3pPr marL="1143000" indent="-228600" algn="l" defTabSz="914400" rtl="0" eaLnBrk="1" latinLnBrk="0" hangingPunct="1">
+              <a:spcBef>
+                <a:spcPct val="20000"/>
+              </a:spcBef>
+              <a:buFont typeface="Arial" pitchFamily="34" charset="0"/>
+              <a:buChar char="•"/>
+              <a:defRPr sz="2400" kern="1200">
+                <a:solidFill>
+                  <a:schemeClr val="tx1"/>
+                </a:solidFill>
+                <a:latin typeface="+mn-lt"/>
+                <a:ea typeface="+mn-ea"/>
+                <a:cs typeface="+mn-cs"/>
+              </a:defRPr>
+            </a:lvl3pPr>
+            <a:lvl4pPr marL="1600200" indent="-228600" algn="l" defTabSz="914400" rtl="0" eaLnBrk="1" latinLnBrk="0" hangingPunct="1">
+              <a:spcBef>
+                <a:spcPct val="20000"/>
+              </a:spcBef>
+              <a:buFont typeface="Arial" pitchFamily="34" charset="0"/>
+              <a:buChar char="–"/>
+              <a:defRPr sz="2000" kern="1200">
+                <a:solidFill>
+                  <a:schemeClr val="tx1"/>
+                </a:solidFill>
+                <a:latin typeface="+mn-lt"/>
+                <a:ea typeface="+mn-ea"/>
+                <a:cs typeface="+mn-cs"/>
+              </a:defRPr>
+            </a:lvl4pPr>
+            <a:lvl5pPr marL="2057400" indent="-228600" algn="l" defTabSz="914400" rtl="0" eaLnBrk="1" latinLnBrk="0" hangingPunct="1">
+              <a:spcBef>
+                <a:spcPct val="20000"/>
+              </a:spcBef>
+              <a:buFont typeface="Arial" pitchFamily="34" charset="0"/>
+              <a:buChar char="»"/>
+              <a:defRPr sz="2000" kern="1200">
+                <a:solidFill>
+                  <a:schemeClr val="tx1"/>
+                </a:solidFill>
+                <a:latin typeface="+mn-lt"/>
+                <a:ea typeface="+mn-ea"/>
+                <a:cs typeface="+mn-cs"/>
+              </a:defRPr>
+            </a:lvl5pPr>
+            <a:lvl6pPr marL="2514600" indent="-228600" algn="l" defTabSz="914400" rtl="0" eaLnBrk="1" latinLnBrk="0" hangingPunct="1">
+              <a:spcBef>
+                <a:spcPct val="20000"/>
+              </a:spcBef>
+              <a:buFont typeface="Arial" pitchFamily="34" charset="0"/>
+              <a:buChar char="•"/>
+              <a:defRPr sz="2000" kern="1200">
+                <a:solidFill>
+                  <a:schemeClr val="tx1"/>
+                </a:solidFill>
+                <a:latin typeface="+mn-lt"/>
+                <a:ea typeface="+mn-ea"/>
+                <a:cs typeface="+mn-cs"/>
+              </a:defRPr>
+            </a:lvl6pPr>
+            <a:lvl7pPr marL="2971800" indent="-228600" algn="l" defTabSz="914400" rtl="0" eaLnBrk="1" latinLnBrk="0" hangingPunct="1">
+              <a:spcBef>
+                <a:spcPct val="20000"/>
+              </a:spcBef>
+              <a:buFont typeface="Arial" pitchFamily="34" charset="0"/>
+              <a:buChar char="•"/>
+              <a:defRPr sz="2000" kern="1200">
+                <a:solidFill>
+                  <a:schemeClr val="tx1"/>
+                </a:solidFill>
+                <a:latin typeface="+mn-lt"/>
+                <a:ea typeface="+mn-ea"/>
+                <a:cs typeface="+mn-cs"/>
+              </a:defRPr>
+            </a:lvl7pPr>
+            <a:lvl8pPr marL="3429000" indent="-228600" algn="l" defTabSz="914400" rtl="0" eaLnBrk="1" latinLnBrk="0" hangingPunct="1">
+              <a:spcBef>
+                <a:spcPct val="20000"/>
+              </a:spcBef>
+              <a:buFont typeface="Arial" pitchFamily="34" charset="0"/>
+              <a:buChar char="•"/>
+              <a:defRPr sz="2000" kern="1200">
+                <a:solidFill>
+                  <a:schemeClr val="tx1"/>
+                </a:solidFill>
+                <a:latin typeface="+mn-lt"/>
+                <a:ea typeface="+mn-ea"/>
+                <a:cs typeface="+mn-cs"/>
+              </a:defRPr>
+            </a:lvl8pPr>
+            <a:lvl9pPr marL="3886200" indent="-228600" algn="l" defTabSz="914400" rtl="0" eaLnBrk="1" latinLnBrk="0" hangingPunct="1">
+              <a:spcBef>
+                <a:spcPct val="20000"/>
+              </a:spcBef>
+              <a:buFont typeface="Arial" pitchFamily="34" charset="0"/>
+              <a:buChar char="•"/>
+              <a:defRPr sz="2000" kern="1200">
+                <a:solidFill>
+                  <a:schemeClr val="tx1"/>
+                </a:solidFill>
+                <a:latin typeface="+mn-lt"/>
+                <a:ea typeface="+mn-ea"/>
+                <a:cs typeface="+mn-cs"/>
+              </a:defRPr>
+            </a:lvl9pPr>
+          </a:lstStyle>
+          <a:p>
+            <a:pPr marL="0" indent="0">
+              <a:buNone/>
+            </a:pPr>
+            <a:r>
+              <a:rPr lang="en-US" sz="4000" b="1" spc="-150" dirty="0">
+                <a:solidFill>
+                  <a:srgbClr val="F5C24C"/>
+                </a:solidFill>
+                <a:latin typeface="Signika Negative" pitchFamily="2" charset="0"/>
+                <a:ea typeface="Franchise" pitchFamily="49" charset="0"/>
+              </a:rPr>
+              <a:t>*</a:t>
+            </a:r>
+            <a:r>
+              <a:rPr lang="en-US" sz="4000" b="1" spc="-150" dirty="0">
+                <a:solidFill>
+                  <a:schemeClr val="tx1">
+                    <a:lumMod val="65000"/>
+                    <a:lumOff val="35000"/>
+                  </a:schemeClr>
+                </a:solidFill>
+                <a:latin typeface="Signika Negative" pitchFamily="2" charset="0"/>
+                <a:ea typeface="Franchise" pitchFamily="49" charset="0"/>
+              </a:rPr>
+              <a:t> </a:t>
+            </a:r>
+            <a:r>
+              <a:rPr lang="en-US" sz="4000" b="1" spc="-150" dirty="0" err="1">
+                <a:solidFill>
+                  <a:schemeClr val="tx1">
+                    <a:lumMod val="65000"/>
+                    <a:lumOff val="35000"/>
+                  </a:schemeClr>
+                </a:solidFill>
+                <a:latin typeface="Signika Negative" pitchFamily="2" charset="0"/>
+                <a:ea typeface="Franchise" pitchFamily="49" charset="0"/>
+              </a:rPr>
+              <a:t>Etape</a:t>
+            </a:r>
+            <a:r>
+              <a:rPr lang="en-US" sz="4000" b="1" spc="-150" dirty="0">
+                <a:solidFill>
+                  <a:schemeClr val="tx1">
+                    <a:lumMod val="65000"/>
+                    <a:lumOff val="35000"/>
+                  </a:schemeClr>
+                </a:solidFill>
+                <a:latin typeface="Signika Negative" pitchFamily="2" charset="0"/>
+                <a:ea typeface="Franchise" pitchFamily="49" charset="0"/>
+              </a:rPr>
+              <a:t> 3 : </a:t>
+            </a:r>
+            <a:r>
+              <a:rPr lang="en-US" sz="4000" b="1" spc="-150" dirty="0" err="1">
+                <a:solidFill>
+                  <a:schemeClr val="tx1">
+                    <a:lumMod val="65000"/>
+                    <a:lumOff val="35000"/>
+                  </a:schemeClr>
+                </a:solidFill>
+                <a:latin typeface="Signika Negative" pitchFamily="2" charset="0"/>
+                <a:ea typeface="Franchise" pitchFamily="49" charset="0"/>
+              </a:rPr>
+              <a:t>Mise</a:t>
+            </a:r>
+            <a:r>
+              <a:rPr lang="en-US" sz="4000" b="1" spc="-150" dirty="0">
+                <a:solidFill>
+                  <a:schemeClr val="tx1">
+                    <a:lumMod val="65000"/>
+                    <a:lumOff val="35000"/>
+                  </a:schemeClr>
+                </a:solidFill>
+                <a:latin typeface="Signika Negative" pitchFamily="2" charset="0"/>
+                <a:ea typeface="Franchise" pitchFamily="49" charset="0"/>
+              </a:rPr>
+              <a:t> a jour de la </a:t>
+            </a:r>
+            <a:r>
+              <a:rPr lang="en-US" sz="4000" b="1" spc="-150" dirty="0" err="1">
+                <a:solidFill>
+                  <a:schemeClr val="tx1">
+                    <a:lumMod val="65000"/>
+                    <a:lumOff val="35000"/>
+                  </a:schemeClr>
+                </a:solidFill>
+                <a:latin typeface="Signika Negative" pitchFamily="2" charset="0"/>
+                <a:ea typeface="Franchise" pitchFamily="49" charset="0"/>
+              </a:rPr>
+              <a:t>branche</a:t>
+            </a:r>
+            <a:r>
+              <a:rPr lang="en-US" sz="4000" b="1" spc="-150" dirty="0">
+                <a:solidFill>
+                  <a:schemeClr val="tx1">
+                    <a:lumMod val="65000"/>
+                    <a:lumOff val="35000"/>
+                  </a:schemeClr>
+                </a:solidFill>
+                <a:latin typeface="Signika Negative" pitchFamily="2" charset="0"/>
+                <a:ea typeface="Franchise" pitchFamily="49" charset="0"/>
+              </a:rPr>
+              <a:t> local</a:t>
+            </a:r>
+          </a:p>
+        </p:txBody>
+      </p:sp>
+      <p:sp>
+        <p:nvSpPr>
+          <p:cNvPr id="6" name="Flowchart: Off-page Connector 29"/>
+          <p:cNvSpPr/>
+          <p:nvPr/>
+        </p:nvSpPr>
+        <p:spPr>
+          <a:xfrm>
+            <a:off x="11526790" y="123637"/>
+            <a:ext cx="505685" cy="313685"/>
+          </a:xfrm>
+          <a:prstGeom prst="flowChartOffpageConnector">
+            <a:avLst/>
+          </a:prstGeom>
+          <a:solidFill>
+            <a:srgbClr val="F5C24C"/>
+          </a:solidFill>
+          <a:ln w="6350">
+            <a:noFill/>
+          </a:ln>
+        </p:spPr>
+        <p:style>
+          <a:lnRef idx="2">
+            <a:schemeClr val="accent1">
+              <a:shade val="50000"/>
+            </a:schemeClr>
+          </a:lnRef>
+          <a:fillRef idx="1">
+            <a:schemeClr val="accent1"/>
+          </a:fillRef>
+          <a:effectRef idx="0">
+            <a:schemeClr val="accent1"/>
+          </a:effectRef>
+          <a:fontRef idx="minor">
+            <a:schemeClr val="lt1"/>
+          </a:fontRef>
+        </p:style>
+        <p:txBody>
+          <a:bodyPr rtlCol="0" anchor="ctr"/>
+          <a:lstStyle/>
+          <a:p>
+            <a:pPr algn="ctr"/>
+            <a:r>
+              <a:rPr lang="en-US" sz="1200" b="1" dirty="0"/>
+              <a:t>23</a:t>
+            </a:r>
+          </a:p>
+        </p:txBody>
+      </p:sp>
+      <p:sp>
+        <p:nvSpPr>
+          <p:cNvPr id="21" name="Rectangle 20"/>
+          <p:cNvSpPr/>
+          <p:nvPr/>
+        </p:nvSpPr>
+        <p:spPr>
+          <a:xfrm>
+            <a:off x="0" y="1712723"/>
+            <a:ext cx="12220790" cy="4968279"/>
+          </a:xfrm>
+          <a:prstGeom prst="rect">
+            <a:avLst/>
+          </a:prstGeom>
+          <a:pattFill prst="pct90">
+            <a:fgClr>
+              <a:srgbClr val="F5C24C"/>
+            </a:fgClr>
+            <a:bgClr>
+              <a:srgbClr val="FFCC00"/>
+            </a:bgClr>
+          </a:pattFill>
+          <a:ln>
+            <a:noFill/>
+          </a:ln>
+        </p:spPr>
+        <p:style>
+          <a:lnRef idx="2">
+            <a:schemeClr val="accent1">
+              <a:shade val="50000"/>
+            </a:schemeClr>
+          </a:lnRef>
+          <a:fillRef idx="1">
+            <a:schemeClr val="accent1"/>
+          </a:fillRef>
+          <a:effectRef idx="0">
+            <a:schemeClr val="accent1"/>
+          </a:effectRef>
+          <a:fontRef idx="minor">
+            <a:schemeClr val="lt1"/>
+          </a:fontRef>
+        </p:style>
+        <p:txBody>
+          <a:bodyPr rtlCol="0" anchor="ctr"/>
+          <a:lstStyle/>
+          <a:p>
+            <a:pPr algn="ctr"/>
+            <a:endParaRPr kumimoji="0" lang="fr-FR" altLang="fr-FR" sz="4800" b="1" i="0" u="none" strike="noStrike" cap="none" normalizeH="0" baseline="0" dirty="0">
+              <a:ln>
+                <a:noFill/>
+              </a:ln>
+              <a:solidFill>
+                <a:schemeClr val="bg1"/>
+              </a:solidFill>
+              <a:effectLst/>
+              <a:latin typeface="+mj-lt"/>
+            </a:endParaRPr>
+          </a:p>
+        </p:txBody>
+      </p:sp>
+      <p:sp>
+        <p:nvSpPr>
+          <p:cNvPr id="23" name="ZoneTexte 22"/>
+          <p:cNvSpPr txBox="1"/>
+          <p:nvPr/>
+        </p:nvSpPr>
+        <p:spPr>
+          <a:xfrm>
+            <a:off x="3212097" y="2937955"/>
+            <a:ext cx="6183694" cy="2246769"/>
+          </a:xfrm>
+          <a:prstGeom prst="rect">
+            <a:avLst/>
+          </a:prstGeom>
+          <a:noFill/>
+        </p:spPr>
+        <p:txBody>
+          <a:bodyPr wrap="square" rtlCol="0">
+            <a:spAutoFit/>
+          </a:bodyPr>
+          <a:lstStyle/>
+          <a:p>
+            <a:r>
+              <a:rPr lang="fr-FR" sz="2800" dirty="0">
+                <a:solidFill>
+                  <a:schemeClr val="bg1"/>
+                </a:solidFill>
+              </a:rPr>
+              <a:t>git </a:t>
+            </a:r>
+            <a:r>
+              <a:rPr lang="fr-FR" sz="2800" dirty="0" err="1">
+                <a:solidFill>
+                  <a:schemeClr val="bg1"/>
+                </a:solidFill>
+              </a:rPr>
+              <a:t>checkout</a:t>
+            </a:r>
+            <a:r>
+              <a:rPr lang="fr-FR" sz="2800" dirty="0">
+                <a:solidFill>
+                  <a:schemeClr val="bg1"/>
+                </a:solidFill>
+              </a:rPr>
+              <a:t> </a:t>
+            </a:r>
+            <a:r>
+              <a:rPr lang="fr-FR" sz="2800" dirty="0" err="1">
+                <a:solidFill>
+                  <a:schemeClr val="bg1"/>
+                </a:solidFill>
+              </a:rPr>
+              <a:t>branch_principale</a:t>
+            </a:r>
+            <a:r>
+              <a:rPr lang="fr-FR" sz="2800" dirty="0">
+                <a:solidFill>
+                  <a:schemeClr val="bg1"/>
+                </a:solidFill>
+              </a:rPr>
+              <a:t> /git pull</a:t>
+            </a:r>
+          </a:p>
+          <a:p>
+            <a:br>
+              <a:rPr lang="fr-FR" sz="2800" dirty="0">
+                <a:solidFill>
+                  <a:schemeClr val="bg1"/>
+                </a:solidFill>
+              </a:rPr>
+            </a:br>
+            <a:r>
+              <a:rPr lang="fr-FR" sz="2800" dirty="0">
+                <a:solidFill>
+                  <a:schemeClr val="bg1"/>
+                </a:solidFill>
+              </a:rPr>
+              <a:t>git </a:t>
+            </a:r>
+            <a:r>
+              <a:rPr lang="fr-FR" sz="2800" dirty="0" err="1">
+                <a:solidFill>
+                  <a:schemeClr val="bg1"/>
+                </a:solidFill>
+              </a:rPr>
+              <a:t>checkout</a:t>
+            </a:r>
+            <a:r>
+              <a:rPr lang="fr-FR" sz="2800" dirty="0">
+                <a:solidFill>
+                  <a:schemeClr val="bg1"/>
+                </a:solidFill>
+              </a:rPr>
+              <a:t> </a:t>
+            </a:r>
+            <a:r>
+              <a:rPr lang="fr-FR" sz="2800" dirty="0" err="1">
+                <a:solidFill>
+                  <a:schemeClr val="bg1"/>
+                </a:solidFill>
+              </a:rPr>
+              <a:t>mabranche</a:t>
+            </a:r>
+            <a:endParaRPr lang="fr-FR" sz="2800" dirty="0">
+              <a:solidFill>
+                <a:schemeClr val="bg1"/>
+              </a:solidFill>
+            </a:endParaRPr>
+          </a:p>
+          <a:p>
+            <a:endParaRPr lang="fr-FR" sz="2800" dirty="0">
+              <a:solidFill>
+                <a:schemeClr val="bg1"/>
+              </a:solidFill>
+            </a:endParaRPr>
+          </a:p>
+          <a:p>
+            <a:r>
+              <a:rPr lang="fr-FR" sz="2800" dirty="0">
+                <a:solidFill>
+                  <a:schemeClr val="bg1"/>
+                </a:solidFill>
+              </a:rPr>
+              <a:t>git </a:t>
+            </a:r>
+            <a:r>
+              <a:rPr lang="fr-FR" sz="2800" dirty="0" err="1">
+                <a:solidFill>
+                  <a:schemeClr val="bg1"/>
+                </a:solidFill>
+              </a:rPr>
+              <a:t>rebase</a:t>
+            </a:r>
+            <a:r>
+              <a:rPr lang="fr-FR" sz="2800" dirty="0">
+                <a:solidFill>
+                  <a:schemeClr val="bg1"/>
+                </a:solidFill>
+              </a:rPr>
+              <a:t> </a:t>
+            </a:r>
+            <a:r>
+              <a:rPr lang="fr-FR" sz="2800" dirty="0" err="1">
+                <a:solidFill>
+                  <a:schemeClr val="bg1"/>
+                </a:solidFill>
+              </a:rPr>
+              <a:t>branche_principale</a:t>
+            </a:r>
+            <a:r>
+              <a:rPr lang="fr-FR" sz="2800" dirty="0">
+                <a:solidFill>
+                  <a:schemeClr val="bg1"/>
+                </a:solidFill>
+              </a:rPr>
+              <a:t> /git push -f</a:t>
+            </a:r>
+          </a:p>
+        </p:txBody>
+      </p:sp>
+    </p:spTree>
+    <p:extLst>
+      <p:ext uri="{BB962C8B-B14F-4D97-AF65-F5344CB8AC3E}">
+        <p14:creationId xmlns:p14="http://schemas.microsoft.com/office/powerpoint/2010/main" val="2821250852"/>
+      </p:ext>
+    </p:extLst>
+  </p:cSld>
+  <p:clrMapOvr>
+    <a:masterClrMapping/>
+  </p:clrMapOvr>
+</p:sld>
+</file>
+
+<file path=ppt/slides/slide25.xml><?xml version="1.0" encoding="utf-8"?>
+<p:sld xmlns:a="http://schemas.openxmlformats.org/drawingml/2006/main" xmlns:r="http://schemas.openxmlformats.org/officeDocument/2006/relationships" xmlns:p="http://schemas.openxmlformats.org/presentationml/2006/main">
+  <p:cSld>
+    <p:spTree>
+      <p:nvGrpSpPr>
+        <p:cNvPr id="1" name=""/>
+        <p:cNvGrpSpPr/>
+        <p:nvPr/>
+      </p:nvGrpSpPr>
+      <p:grpSpPr>
+        <a:xfrm>
+          <a:off x="0" y="0"/>
+          <a:ext cx="0" cy="0"/>
+          <a:chOff x="0" y="0"/>
+          <a:chExt cx="0" cy="0"/>
+        </a:xfrm>
+      </p:grpSpPr>
+      <p:sp>
+        <p:nvSpPr>
+          <p:cNvPr id="5" name="Subtitle 2"/>
+          <p:cNvSpPr txBox="1">
+            <a:spLocks/>
+          </p:cNvSpPr>
+          <p:nvPr/>
+        </p:nvSpPr>
+        <p:spPr>
+          <a:xfrm>
+            <a:off x="145774" y="665312"/>
+            <a:ext cx="11886701" cy="603448"/>
+          </a:xfrm>
+          <a:prstGeom prst="rect">
+            <a:avLst/>
+          </a:prstGeom>
+        </p:spPr>
+        <p:txBody>
+          <a:bodyPr vert="horz" lIns="91440" tIns="45720" rIns="91440" bIns="45720" rtlCol="0">
+            <a:noAutofit/>
+          </a:bodyPr>
+          <a:lstStyle>
+            <a:lvl1pPr marL="342900" indent="-342900" algn="l" defTabSz="914400" rtl="0" eaLnBrk="1" latinLnBrk="0" hangingPunct="1">
+              <a:spcBef>
+                <a:spcPct val="20000"/>
+              </a:spcBef>
+              <a:buFont typeface="Arial" pitchFamily="34" charset="0"/>
+              <a:buChar char="•"/>
+              <a:defRPr sz="3200" kern="1200">
+                <a:solidFill>
+                  <a:schemeClr val="tx1"/>
+                </a:solidFill>
+                <a:latin typeface="+mn-lt"/>
+                <a:ea typeface="+mn-ea"/>
+                <a:cs typeface="+mn-cs"/>
+              </a:defRPr>
+            </a:lvl1pPr>
+            <a:lvl2pPr marL="742950" indent="-285750" algn="l" defTabSz="914400" rtl="0" eaLnBrk="1" latinLnBrk="0" hangingPunct="1">
+              <a:spcBef>
+                <a:spcPct val="20000"/>
+              </a:spcBef>
+              <a:buFont typeface="Arial" pitchFamily="34" charset="0"/>
+              <a:buChar char="–"/>
+              <a:defRPr sz="2800" kern="1200">
+                <a:solidFill>
+                  <a:schemeClr val="tx1"/>
+                </a:solidFill>
+                <a:latin typeface="+mn-lt"/>
+                <a:ea typeface="+mn-ea"/>
+                <a:cs typeface="+mn-cs"/>
+              </a:defRPr>
+            </a:lvl2pPr>
+            <a:lvl3pPr marL="1143000" indent="-228600" algn="l" defTabSz="914400" rtl="0" eaLnBrk="1" latinLnBrk="0" hangingPunct="1">
+              <a:spcBef>
+                <a:spcPct val="20000"/>
+              </a:spcBef>
+              <a:buFont typeface="Arial" pitchFamily="34" charset="0"/>
+              <a:buChar char="•"/>
+              <a:defRPr sz="2400" kern="1200">
+                <a:solidFill>
+                  <a:schemeClr val="tx1"/>
+                </a:solidFill>
+                <a:latin typeface="+mn-lt"/>
+                <a:ea typeface="+mn-ea"/>
+                <a:cs typeface="+mn-cs"/>
+              </a:defRPr>
+            </a:lvl3pPr>
+            <a:lvl4pPr marL="1600200" indent="-228600" algn="l" defTabSz="914400" rtl="0" eaLnBrk="1" latinLnBrk="0" hangingPunct="1">
+              <a:spcBef>
+                <a:spcPct val="20000"/>
+              </a:spcBef>
+              <a:buFont typeface="Arial" pitchFamily="34" charset="0"/>
+              <a:buChar char="–"/>
+              <a:defRPr sz="2000" kern="1200">
+                <a:solidFill>
+                  <a:schemeClr val="tx1"/>
+                </a:solidFill>
+                <a:latin typeface="+mn-lt"/>
+                <a:ea typeface="+mn-ea"/>
+                <a:cs typeface="+mn-cs"/>
+              </a:defRPr>
+            </a:lvl4pPr>
+            <a:lvl5pPr marL="2057400" indent="-228600" algn="l" defTabSz="914400" rtl="0" eaLnBrk="1" latinLnBrk="0" hangingPunct="1">
+              <a:spcBef>
+                <a:spcPct val="20000"/>
+              </a:spcBef>
+              <a:buFont typeface="Arial" pitchFamily="34" charset="0"/>
+              <a:buChar char="»"/>
+              <a:defRPr sz="2000" kern="1200">
+                <a:solidFill>
+                  <a:schemeClr val="tx1"/>
+                </a:solidFill>
+                <a:latin typeface="+mn-lt"/>
+                <a:ea typeface="+mn-ea"/>
+                <a:cs typeface="+mn-cs"/>
+              </a:defRPr>
+            </a:lvl5pPr>
+            <a:lvl6pPr marL="2514600" indent="-228600" algn="l" defTabSz="914400" rtl="0" eaLnBrk="1" latinLnBrk="0" hangingPunct="1">
+              <a:spcBef>
+                <a:spcPct val="20000"/>
+              </a:spcBef>
+              <a:buFont typeface="Arial" pitchFamily="34" charset="0"/>
+              <a:buChar char="•"/>
+              <a:defRPr sz="2000" kern="1200">
+                <a:solidFill>
+                  <a:schemeClr val="tx1"/>
+                </a:solidFill>
+                <a:latin typeface="+mn-lt"/>
+                <a:ea typeface="+mn-ea"/>
+                <a:cs typeface="+mn-cs"/>
+              </a:defRPr>
+            </a:lvl6pPr>
+            <a:lvl7pPr marL="2971800" indent="-228600" algn="l" defTabSz="914400" rtl="0" eaLnBrk="1" latinLnBrk="0" hangingPunct="1">
+              <a:spcBef>
+                <a:spcPct val="20000"/>
+              </a:spcBef>
+              <a:buFont typeface="Arial" pitchFamily="34" charset="0"/>
+              <a:buChar char="•"/>
+              <a:defRPr sz="2000" kern="1200">
+                <a:solidFill>
+                  <a:schemeClr val="tx1"/>
+                </a:solidFill>
+                <a:latin typeface="+mn-lt"/>
+                <a:ea typeface="+mn-ea"/>
+                <a:cs typeface="+mn-cs"/>
+              </a:defRPr>
+            </a:lvl7pPr>
+            <a:lvl8pPr marL="3429000" indent="-228600" algn="l" defTabSz="914400" rtl="0" eaLnBrk="1" latinLnBrk="0" hangingPunct="1">
+              <a:spcBef>
+                <a:spcPct val="20000"/>
+              </a:spcBef>
+              <a:buFont typeface="Arial" pitchFamily="34" charset="0"/>
+              <a:buChar char="•"/>
+              <a:defRPr sz="2000" kern="1200">
+                <a:solidFill>
+                  <a:schemeClr val="tx1"/>
+                </a:solidFill>
+                <a:latin typeface="+mn-lt"/>
+                <a:ea typeface="+mn-ea"/>
+                <a:cs typeface="+mn-cs"/>
+              </a:defRPr>
+            </a:lvl8pPr>
+            <a:lvl9pPr marL="3886200" indent="-228600" algn="l" defTabSz="914400" rtl="0" eaLnBrk="1" latinLnBrk="0" hangingPunct="1">
+              <a:spcBef>
+                <a:spcPct val="20000"/>
+              </a:spcBef>
+              <a:buFont typeface="Arial" pitchFamily="34" charset="0"/>
+              <a:buChar char="•"/>
+              <a:defRPr sz="2000" kern="1200">
+                <a:solidFill>
+                  <a:schemeClr val="tx1"/>
+                </a:solidFill>
+                <a:latin typeface="+mn-lt"/>
+                <a:ea typeface="+mn-ea"/>
+                <a:cs typeface="+mn-cs"/>
+              </a:defRPr>
+            </a:lvl9pPr>
+          </a:lstStyle>
+          <a:p>
+            <a:pPr marL="0" indent="0">
+              <a:buNone/>
+            </a:pPr>
+            <a:r>
+              <a:rPr lang="en-US" sz="4000" b="1" spc="-150" dirty="0">
+                <a:solidFill>
+                  <a:srgbClr val="F5C24C"/>
+                </a:solidFill>
+                <a:latin typeface="Signika Negative" pitchFamily="2" charset="0"/>
+                <a:ea typeface="Franchise" pitchFamily="49" charset="0"/>
+              </a:rPr>
+              <a:t>*</a:t>
+            </a:r>
+            <a:r>
+              <a:rPr lang="en-US" sz="4000" b="1" spc="-150" dirty="0">
+                <a:solidFill>
+                  <a:schemeClr val="tx1">
+                    <a:lumMod val="65000"/>
+                    <a:lumOff val="35000"/>
+                  </a:schemeClr>
+                </a:solidFill>
+                <a:latin typeface="Signika Negative" pitchFamily="2" charset="0"/>
+                <a:ea typeface="Franchise" pitchFamily="49" charset="0"/>
+              </a:rPr>
+              <a:t> </a:t>
+            </a:r>
+            <a:r>
+              <a:rPr lang="en-US" sz="4000" b="1" spc="-150" dirty="0" err="1">
+                <a:solidFill>
+                  <a:schemeClr val="tx1">
+                    <a:lumMod val="65000"/>
+                    <a:lumOff val="35000"/>
+                  </a:schemeClr>
+                </a:solidFill>
+                <a:latin typeface="Signika Negative" pitchFamily="2" charset="0"/>
+                <a:ea typeface="Franchise" pitchFamily="49" charset="0"/>
+              </a:rPr>
+              <a:t>Etape</a:t>
+            </a:r>
+            <a:r>
+              <a:rPr lang="en-US" sz="4000" b="1" spc="-150" dirty="0">
+                <a:solidFill>
+                  <a:schemeClr val="tx1">
+                    <a:lumMod val="65000"/>
+                    <a:lumOff val="35000"/>
+                  </a:schemeClr>
+                </a:solidFill>
+                <a:latin typeface="Signika Negative" pitchFamily="2" charset="0"/>
+                <a:ea typeface="Franchise" pitchFamily="49" charset="0"/>
+              </a:rPr>
+              <a:t> 4 : Merge de la </a:t>
+            </a:r>
+            <a:r>
+              <a:rPr lang="en-US" sz="4000" b="1" spc="-150" dirty="0" err="1">
+                <a:solidFill>
+                  <a:schemeClr val="tx1">
+                    <a:lumMod val="65000"/>
+                    <a:lumOff val="35000"/>
+                  </a:schemeClr>
+                </a:solidFill>
+                <a:latin typeface="Signika Negative" pitchFamily="2" charset="0"/>
+                <a:ea typeface="Franchise" pitchFamily="49" charset="0"/>
+              </a:rPr>
+              <a:t>branche</a:t>
+            </a:r>
+            <a:endParaRPr lang="en-US" sz="4000" b="1" spc="-150" dirty="0">
+              <a:solidFill>
+                <a:schemeClr val="tx1">
+                  <a:lumMod val="65000"/>
+                  <a:lumOff val="35000"/>
+                </a:schemeClr>
+              </a:solidFill>
+              <a:latin typeface="Signika Negative" pitchFamily="2" charset="0"/>
+              <a:ea typeface="Franchise" pitchFamily="49" charset="0"/>
+            </a:endParaRPr>
+          </a:p>
+        </p:txBody>
+      </p:sp>
+      <p:sp>
+        <p:nvSpPr>
+          <p:cNvPr id="6" name="Flowchart: Off-page Connector 29"/>
+          <p:cNvSpPr/>
+          <p:nvPr/>
+        </p:nvSpPr>
+        <p:spPr>
+          <a:xfrm>
+            <a:off x="11526790" y="123637"/>
+            <a:ext cx="505685" cy="313685"/>
+          </a:xfrm>
+          <a:prstGeom prst="flowChartOffpageConnector">
+            <a:avLst/>
+          </a:prstGeom>
+          <a:solidFill>
+            <a:srgbClr val="F5C24C"/>
+          </a:solidFill>
+          <a:ln w="6350">
+            <a:noFill/>
+          </a:ln>
+        </p:spPr>
+        <p:style>
+          <a:lnRef idx="2">
+            <a:schemeClr val="accent1">
+              <a:shade val="50000"/>
+            </a:schemeClr>
+          </a:lnRef>
+          <a:fillRef idx="1">
+            <a:schemeClr val="accent1"/>
+          </a:fillRef>
+          <a:effectRef idx="0">
+            <a:schemeClr val="accent1"/>
+          </a:effectRef>
+          <a:fontRef idx="minor">
+            <a:schemeClr val="lt1"/>
+          </a:fontRef>
+        </p:style>
+        <p:txBody>
+          <a:bodyPr rtlCol="0" anchor="ctr"/>
+          <a:lstStyle/>
+          <a:p>
+            <a:pPr algn="ctr"/>
+            <a:r>
+              <a:rPr lang="en-US" sz="1200" b="1" dirty="0"/>
+              <a:t>24</a:t>
+            </a:r>
+          </a:p>
+        </p:txBody>
+      </p:sp>
+      <p:sp>
+        <p:nvSpPr>
+          <p:cNvPr id="21" name="Rectangle 20"/>
+          <p:cNvSpPr/>
+          <p:nvPr/>
+        </p:nvSpPr>
+        <p:spPr>
+          <a:xfrm>
+            <a:off x="0" y="1712723"/>
+            <a:ext cx="12220790" cy="4968279"/>
+          </a:xfrm>
+          <a:prstGeom prst="rect">
+            <a:avLst/>
+          </a:prstGeom>
+          <a:pattFill prst="pct90">
+            <a:fgClr>
+              <a:srgbClr val="F5C24C"/>
+            </a:fgClr>
+            <a:bgClr>
+              <a:srgbClr val="FFCC00"/>
+            </a:bgClr>
+          </a:pattFill>
+          <a:ln>
+            <a:noFill/>
+          </a:ln>
+        </p:spPr>
+        <p:style>
+          <a:lnRef idx="2">
+            <a:schemeClr val="accent1">
+              <a:shade val="50000"/>
+            </a:schemeClr>
+          </a:lnRef>
+          <a:fillRef idx="1">
+            <a:schemeClr val="accent1"/>
+          </a:fillRef>
+          <a:effectRef idx="0">
+            <a:schemeClr val="accent1"/>
+          </a:effectRef>
+          <a:fontRef idx="minor">
+            <a:schemeClr val="lt1"/>
+          </a:fontRef>
+        </p:style>
+        <p:txBody>
+          <a:bodyPr rtlCol="0" anchor="ctr"/>
+          <a:lstStyle/>
+          <a:p>
+            <a:pPr algn="ctr"/>
+            <a:endParaRPr kumimoji="0" lang="fr-FR" altLang="fr-FR" sz="4800" b="1" i="0" u="none" strike="noStrike" cap="none" normalizeH="0" baseline="0" dirty="0">
+              <a:ln>
+                <a:noFill/>
+              </a:ln>
+              <a:solidFill>
+                <a:schemeClr val="bg1"/>
+              </a:solidFill>
+              <a:effectLst/>
+              <a:latin typeface="+mj-lt"/>
+            </a:endParaRPr>
+          </a:p>
+        </p:txBody>
+      </p:sp>
+      <p:sp>
+        <p:nvSpPr>
+          <p:cNvPr id="23" name="ZoneTexte 22"/>
+          <p:cNvSpPr txBox="1"/>
+          <p:nvPr/>
+        </p:nvSpPr>
+        <p:spPr>
+          <a:xfrm>
+            <a:off x="3212097" y="2937955"/>
+            <a:ext cx="6183694" cy="2246769"/>
+          </a:xfrm>
+          <a:prstGeom prst="rect">
+            <a:avLst/>
+          </a:prstGeom>
+          <a:noFill/>
+        </p:spPr>
+        <p:txBody>
+          <a:bodyPr wrap="square" rtlCol="0">
+            <a:spAutoFit/>
+          </a:bodyPr>
+          <a:lstStyle/>
+          <a:p>
+            <a:r>
+              <a:rPr lang="fr-FR" sz="2800" dirty="0">
+                <a:solidFill>
+                  <a:schemeClr val="bg1"/>
+                </a:solidFill>
+              </a:rPr>
+              <a:t>git </a:t>
+            </a:r>
+            <a:r>
+              <a:rPr lang="fr-FR" sz="2800" dirty="0" err="1">
+                <a:solidFill>
+                  <a:schemeClr val="bg1"/>
+                </a:solidFill>
+              </a:rPr>
+              <a:t>checkout</a:t>
+            </a:r>
+            <a:r>
+              <a:rPr lang="fr-FR" sz="2800" dirty="0">
+                <a:solidFill>
+                  <a:schemeClr val="bg1"/>
+                </a:solidFill>
+              </a:rPr>
+              <a:t> </a:t>
+            </a:r>
+            <a:r>
+              <a:rPr lang="fr-FR" sz="2800" dirty="0" err="1">
+                <a:solidFill>
+                  <a:schemeClr val="bg1"/>
+                </a:solidFill>
+              </a:rPr>
+              <a:t>branche_principale</a:t>
+            </a:r>
+            <a:endParaRPr lang="fr-FR" sz="2800" dirty="0">
+              <a:solidFill>
+                <a:schemeClr val="bg1"/>
+              </a:solidFill>
+            </a:endParaRPr>
+          </a:p>
+          <a:p>
+            <a:endParaRPr lang="fr-FR" sz="2800" dirty="0">
+              <a:solidFill>
+                <a:schemeClr val="bg1"/>
+              </a:solidFill>
+            </a:endParaRPr>
+          </a:p>
+          <a:p>
+            <a:r>
+              <a:rPr lang="fr-FR" sz="2800" dirty="0">
+                <a:solidFill>
+                  <a:schemeClr val="bg1"/>
+                </a:solidFill>
+              </a:rPr>
+              <a:t>git </a:t>
+            </a:r>
+            <a:r>
+              <a:rPr lang="fr-FR" sz="2800" dirty="0" err="1">
+                <a:solidFill>
+                  <a:schemeClr val="bg1"/>
+                </a:solidFill>
+              </a:rPr>
+              <a:t>merge</a:t>
+            </a:r>
+            <a:r>
+              <a:rPr lang="fr-FR" sz="2800" dirty="0">
+                <a:solidFill>
+                  <a:schemeClr val="bg1"/>
+                </a:solidFill>
+              </a:rPr>
+              <a:t> </a:t>
+            </a:r>
+            <a:r>
+              <a:rPr lang="fr-FR" sz="2800" dirty="0" err="1">
+                <a:solidFill>
+                  <a:schemeClr val="bg1"/>
+                </a:solidFill>
+              </a:rPr>
+              <a:t>mabranche</a:t>
+            </a:r>
+            <a:r>
+              <a:rPr lang="fr-FR" sz="2800" dirty="0">
+                <a:solidFill>
+                  <a:schemeClr val="bg1"/>
+                </a:solidFill>
+              </a:rPr>
+              <a:t> –no-</a:t>
+            </a:r>
+            <a:r>
+              <a:rPr lang="fr-FR" sz="2800" dirty="0" err="1">
+                <a:solidFill>
+                  <a:schemeClr val="bg1"/>
+                </a:solidFill>
+              </a:rPr>
+              <a:t>ff</a:t>
+            </a:r>
+            <a:endParaRPr lang="fr-FR" sz="2800" dirty="0">
+              <a:solidFill>
+                <a:schemeClr val="bg1"/>
+              </a:solidFill>
+            </a:endParaRPr>
+          </a:p>
+          <a:p>
+            <a:endParaRPr lang="fr-FR" sz="2800" dirty="0">
+              <a:solidFill>
+                <a:schemeClr val="bg1"/>
+              </a:solidFill>
+            </a:endParaRPr>
+          </a:p>
+          <a:p>
+            <a:r>
+              <a:rPr lang="fr-FR" sz="2800" dirty="0">
+                <a:solidFill>
+                  <a:schemeClr val="bg1"/>
+                </a:solidFill>
+              </a:rPr>
+              <a:t>git commit / git push</a:t>
+            </a:r>
+          </a:p>
+        </p:txBody>
+      </p:sp>
+      <p:cxnSp>
+        <p:nvCxnSpPr>
+          <p:cNvPr id="3" name="Connecteur : en angle 2"/>
+          <p:cNvCxnSpPr/>
+          <p:nvPr/>
+        </p:nvCxnSpPr>
+        <p:spPr>
+          <a:xfrm>
+            <a:off x="6559826" y="4876800"/>
+            <a:ext cx="914400" cy="662609"/>
+          </a:xfrm>
+          <a:prstGeom prst="bentConnector3">
+            <a:avLst/>
+          </a:prstGeom>
+          <a:ln>
+            <a:solidFill>
+              <a:schemeClr val="bg1"/>
+            </a:solidFill>
+            <a:tailEnd type="triangle"/>
+          </a:ln>
+        </p:spPr>
+        <p:style>
+          <a:lnRef idx="1">
+            <a:schemeClr val="accent1"/>
+          </a:lnRef>
+          <a:fillRef idx="0">
+            <a:schemeClr val="accent1"/>
+          </a:fillRef>
+          <a:effectRef idx="0">
+            <a:schemeClr val="accent1"/>
+          </a:effectRef>
+          <a:fontRef idx="minor">
+            <a:schemeClr val="tx1"/>
+          </a:fontRef>
+        </p:style>
+      </p:cxnSp>
+      <p:sp>
+        <p:nvSpPr>
+          <p:cNvPr id="4" name="ZoneTexte 3"/>
+          <p:cNvSpPr txBox="1"/>
+          <p:nvPr/>
+        </p:nvSpPr>
+        <p:spPr>
+          <a:xfrm>
+            <a:off x="7474226" y="5354743"/>
+            <a:ext cx="987706" cy="369332"/>
+          </a:xfrm>
+          <a:prstGeom prst="rect">
+            <a:avLst/>
+          </a:prstGeom>
+          <a:noFill/>
+        </p:spPr>
+        <p:txBody>
+          <a:bodyPr wrap="none" rtlCol="0">
+            <a:spAutoFit/>
+          </a:bodyPr>
+          <a:lstStyle/>
+          <a:p>
+            <a:r>
+              <a:rPr lang="fr-FR" dirty="0">
+                <a:solidFill>
+                  <a:schemeClr val="bg1"/>
+                </a:solidFill>
+              </a:rPr>
+              <a:t>Si conflit</a:t>
+            </a:r>
+          </a:p>
+        </p:txBody>
+      </p:sp>
+    </p:spTree>
+    <p:extLst>
+      <p:ext uri="{BB962C8B-B14F-4D97-AF65-F5344CB8AC3E}">
+        <p14:creationId xmlns:p14="http://schemas.microsoft.com/office/powerpoint/2010/main" val="864496597"/>
+      </p:ext>
+    </p:extLst>
+  </p:cSld>
+  <p:clrMapOvr>
+    <a:masterClrMapping/>
+  </p:clrMapOvr>
+</p:sld>
+</file>
+
 <file path=ppt/slides/slide3.xml><?xml version="1.0" encoding="utf-8"?>
 <p:sld xmlns:a="http://schemas.openxmlformats.org/drawingml/2006/main" xmlns:r="http://schemas.openxmlformats.org/officeDocument/2006/relationships" xmlns:p="http://schemas.openxmlformats.org/presentationml/2006/main">
   <p:cSld>

</xml_diff>